<commit_message>
Added advanced mysql lection and examples
</commit_message>
<xml_diff>
--- a/10.advanced-mysql.pptx
+++ b/10.advanced-mysql.pptx
@@ -5,12 +5,30 @@
     <p:sldMasterId id="2147483660" r:id="rId1"/>
   </p:sldMasterIdLst>
   <p:notesMasterIdLst>
-    <p:notesMasterId r:id="rId5"/>
+    <p:notesMasterId r:id="rId23"/>
   </p:notesMasterIdLst>
   <p:sldIdLst>
     <p:sldId id="256" r:id="rId2"/>
     <p:sldId id="257" r:id="rId3"/>
     <p:sldId id="258" r:id="rId4"/>
+    <p:sldId id="259" r:id="rId5"/>
+    <p:sldId id="260" r:id="rId6"/>
+    <p:sldId id="261" r:id="rId7"/>
+    <p:sldId id="262" r:id="rId8"/>
+    <p:sldId id="263" r:id="rId9"/>
+    <p:sldId id="264" r:id="rId10"/>
+    <p:sldId id="265" r:id="rId11"/>
+    <p:sldId id="266" r:id="rId12"/>
+    <p:sldId id="267" r:id="rId13"/>
+    <p:sldId id="268" r:id="rId14"/>
+    <p:sldId id="269" r:id="rId15"/>
+    <p:sldId id="270" r:id="rId16"/>
+    <p:sldId id="272" r:id="rId17"/>
+    <p:sldId id="271" r:id="rId18"/>
+    <p:sldId id="273" r:id="rId19"/>
+    <p:sldId id="274" r:id="rId20"/>
+    <p:sldId id="275" r:id="rId21"/>
+    <p:sldId id="276" r:id="rId22"/>
   </p:sldIdLst>
   <p:sldSz cx="12192000" cy="6858000"/>
   <p:notesSz cx="6858000" cy="9144000"/>
@@ -199,7 +217,7 @@
           <a:p>
             <a:fld id="{77FC3B86-2742-46E2-A44D-1FAB0C668CD5}" type="datetimeFigureOut">
               <a:rPr lang="en-US" smtClean="0"/>
-              <a:t>12/9/2014</a:t>
+              <a:t>12/10/2014</a:t>
             </a:fld>
             <a:endParaRPr lang="en-US"/>
           </a:p>
@@ -638,7 +656,7 @@
           <a:p>
             <a:fld id="{8E57C33F-FC88-4120-B878-9148FF06A660}" type="datetimeFigureOut">
               <a:rPr lang="en-US" smtClean="0"/>
-              <a:t>12/9/2014</a:t>
+              <a:t>12/10/2014</a:t>
             </a:fld>
             <a:endParaRPr lang="en-US"/>
           </a:p>
@@ -950,7 +968,7 @@
           <a:p>
             <a:fld id="{8E57C33F-FC88-4120-B878-9148FF06A660}" type="datetimeFigureOut">
               <a:rPr lang="en-US" smtClean="0"/>
-              <a:t>12/9/2014</a:t>
+              <a:t>12/10/2014</a:t>
             </a:fld>
             <a:endParaRPr lang="en-US"/>
           </a:p>
@@ -1172,7 +1190,7 @@
           <a:p>
             <a:fld id="{8E57C33F-FC88-4120-B878-9148FF06A660}" type="datetimeFigureOut">
               <a:rPr lang="en-US" smtClean="0"/>
-              <a:t>12/9/2014</a:t>
+              <a:t>12/10/2014</a:t>
             </a:fld>
             <a:endParaRPr lang="en-US"/>
           </a:p>
@@ -1463,7 +1481,7 @@
           <a:p>
             <a:fld id="{8E57C33F-FC88-4120-B878-9148FF06A660}" type="datetimeFigureOut">
               <a:rPr lang="en-US" smtClean="0"/>
-              <a:t>12/9/2014</a:t>
+              <a:t>12/10/2014</a:t>
             </a:fld>
             <a:endParaRPr lang="en-US"/>
           </a:p>
@@ -1917,7 +1935,7 @@
           <a:p>
             <a:fld id="{8E57C33F-FC88-4120-B878-9148FF06A660}" type="datetimeFigureOut">
               <a:rPr lang="en-US" smtClean="0"/>
-              <a:t>12/9/2014</a:t>
+              <a:t>12/10/2014</a:t>
             </a:fld>
             <a:endParaRPr lang="en-US"/>
           </a:p>
@@ -2493,7 +2511,7 @@
           <a:p>
             <a:fld id="{8E57C33F-FC88-4120-B878-9148FF06A660}" type="datetimeFigureOut">
               <a:rPr lang="en-US" smtClean="0"/>
-              <a:t>12/9/2014</a:t>
+              <a:t>12/10/2014</a:t>
             </a:fld>
             <a:endParaRPr lang="en-US"/>
           </a:p>
@@ -3345,7 +3363,7 @@
           <a:p>
             <a:fld id="{8E57C33F-FC88-4120-B878-9148FF06A660}" type="datetimeFigureOut">
               <a:rPr lang="en-US" smtClean="0"/>
-              <a:t>12/9/2014</a:t>
+              <a:t>12/10/2014</a:t>
             </a:fld>
             <a:endParaRPr lang="en-US"/>
           </a:p>
@@ -3550,7 +3568,7 @@
           <a:p>
             <a:fld id="{8E57C33F-FC88-4120-B878-9148FF06A660}" type="datetimeFigureOut">
               <a:rPr lang="en-US" smtClean="0"/>
-              <a:t>12/9/2014</a:t>
+              <a:t>12/10/2014</a:t>
             </a:fld>
             <a:endParaRPr lang="en-US"/>
           </a:p>
@@ -3764,7 +3782,7 @@
           <a:p>
             <a:fld id="{8E57C33F-FC88-4120-B878-9148FF06A660}" type="datetimeFigureOut">
               <a:rPr lang="en-US" smtClean="0"/>
-              <a:t>12/9/2014</a:t>
+              <a:t>12/10/2014</a:t>
             </a:fld>
             <a:endParaRPr lang="en-US"/>
           </a:p>
@@ -3969,7 +3987,7 @@
           <a:p>
             <a:fld id="{8E57C33F-FC88-4120-B878-9148FF06A660}" type="datetimeFigureOut">
               <a:rPr lang="en-US" smtClean="0"/>
-              <a:t>12/9/2014</a:t>
+              <a:t>12/10/2014</a:t>
             </a:fld>
             <a:endParaRPr lang="en-US"/>
           </a:p>
@@ -4249,7 +4267,7 @@
           <a:p>
             <a:fld id="{8E57C33F-FC88-4120-B878-9148FF06A660}" type="datetimeFigureOut">
               <a:rPr lang="en-US" smtClean="0"/>
-              <a:t>12/9/2014</a:t>
+              <a:t>12/10/2014</a:t>
             </a:fld>
             <a:endParaRPr lang="en-US"/>
           </a:p>
@@ -4516,7 +4534,7 @@
           <a:p>
             <a:fld id="{8E57C33F-FC88-4120-B878-9148FF06A660}" type="datetimeFigureOut">
               <a:rPr lang="en-US" smtClean="0"/>
-              <a:t>12/9/2014</a:t>
+              <a:t>12/10/2014</a:t>
             </a:fld>
             <a:endParaRPr lang="en-US"/>
           </a:p>
@@ -4931,7 +4949,7 @@
           <a:p>
             <a:fld id="{8E57C33F-FC88-4120-B878-9148FF06A660}" type="datetimeFigureOut">
               <a:rPr lang="en-US" smtClean="0"/>
-              <a:t>12/9/2014</a:t>
+              <a:t>12/10/2014</a:t>
             </a:fld>
             <a:endParaRPr lang="en-US"/>
           </a:p>
@@ -5079,7 +5097,7 @@
           <a:p>
             <a:fld id="{8E57C33F-FC88-4120-B878-9148FF06A660}" type="datetimeFigureOut">
               <a:rPr lang="en-US" smtClean="0"/>
-              <a:t>12/9/2014</a:t>
+              <a:t>12/10/2014</a:t>
             </a:fld>
             <a:endParaRPr lang="en-US"/>
           </a:p>
@@ -5204,7 +5222,7 @@
           <a:p>
             <a:fld id="{8E57C33F-FC88-4120-B878-9148FF06A660}" type="datetimeFigureOut">
               <a:rPr lang="en-US" smtClean="0"/>
-              <a:t>12/9/2014</a:t>
+              <a:t>12/10/2014</a:t>
             </a:fld>
             <a:endParaRPr lang="en-US"/>
           </a:p>
@@ -5483,7 +5501,7 @@
           <a:p>
             <a:fld id="{8E57C33F-FC88-4120-B878-9148FF06A660}" type="datetimeFigureOut">
               <a:rPr lang="en-US" smtClean="0"/>
-              <a:t>12/9/2014</a:t>
+              <a:t>12/10/2014</a:t>
             </a:fld>
             <a:endParaRPr lang="en-US"/>
           </a:p>
@@ -5795,7 +5813,7 @@
           <a:p>
             <a:fld id="{8E57C33F-FC88-4120-B878-9148FF06A660}" type="datetimeFigureOut">
               <a:rPr lang="en-US" smtClean="0"/>
-              <a:t>12/9/2014</a:t>
+              <a:t>12/10/2014</a:t>
             </a:fld>
             <a:endParaRPr lang="en-US"/>
           </a:p>
@@ -6048,7 +6066,7 @@
           <a:p>
             <a:fld id="{8E57C33F-FC88-4120-B878-9148FF06A660}" type="datetimeFigureOut">
               <a:rPr lang="en-US" smtClean="0"/>
-              <a:t>12/9/2014</a:t>
+              <a:t>12/10/2014</a:t>
             </a:fld>
             <a:endParaRPr lang="en-US"/>
           </a:p>
@@ -6548,6 +6566,1158 @@
 </p:sld>
 </file>
 
+<file path=ppt/slides/slide10.xml><?xml version="1.0" encoding="utf-8"?>
+<p:sld xmlns:a="http://schemas.openxmlformats.org/drawingml/2006/main" xmlns:r="http://schemas.openxmlformats.org/officeDocument/2006/relationships" xmlns:p="http://schemas.openxmlformats.org/presentationml/2006/main">
+  <p:cSld>
+    <p:spTree>
+      <p:nvGrpSpPr>
+        <p:cNvPr id="1" name=""/>
+        <p:cNvGrpSpPr/>
+        <p:nvPr/>
+      </p:nvGrpSpPr>
+      <p:grpSpPr>
+        <a:xfrm>
+          <a:off x="0" y="0"/>
+          <a:ext cx="0" cy="0"/>
+          <a:chOff x="0" y="0"/>
+          <a:chExt cx="0" cy="0"/>
+        </a:xfrm>
+      </p:grpSpPr>
+      <p:sp>
+        <p:nvSpPr>
+          <p:cNvPr id="2" name="Title 1"/>
+          <p:cNvSpPr>
+            <a:spLocks noGrp="1"/>
+          </p:cNvSpPr>
+          <p:nvPr>
+            <p:ph type="title"/>
+          </p:nvPr>
+        </p:nvSpPr>
+        <p:spPr/>
+        <p:txBody>
+          <a:bodyPr/>
+          <a:lstStyle/>
+          <a:p>
+            <a:r>
+              <a:rPr lang="bg-BG" dirty="0"/>
+              <a:t>Псевдоними на таблици и </a:t>
+            </a:r>
+            <a:r>
+              <a:rPr lang="bg-BG" dirty="0" smtClean="0"/>
+              <a:t>колони демо</a:t>
+            </a:r>
+            <a:endParaRPr lang="en-US" dirty="0"/>
+          </a:p>
+        </p:txBody>
+      </p:sp>
+      <p:pic>
+        <p:nvPicPr>
+          <p:cNvPr id="4098" name="Picture 2" descr="http://www.trademarkia.com/services/logo.ashx?sid=85781668"/>
+          <p:cNvPicPr>
+            <a:picLocks noChangeAspect="1" noChangeArrowheads="1"/>
+          </p:cNvPicPr>
+          <p:nvPr/>
+        </p:nvPicPr>
+        <p:blipFill>
+          <a:blip r:embed="rId2">
+            <a:extLst>
+              <a:ext uri="{28A0092B-C50C-407E-A947-70E740481C1C}">
+                <a14:useLocalDpi xmlns:a14="http://schemas.microsoft.com/office/drawing/2010/main" val="0"/>
+              </a:ext>
+            </a:extLst>
+          </a:blip>
+          <a:srcRect/>
+          <a:stretch>
+            <a:fillRect/>
+          </a:stretch>
+        </p:blipFill>
+        <p:spPr bwMode="auto">
+          <a:xfrm>
+            <a:off x="2305540" y="2214694"/>
+            <a:ext cx="7580919" cy="3158718"/>
+          </a:xfrm>
+          <a:prstGeom prst="rect">
+            <a:avLst/>
+          </a:prstGeom>
+          <a:noFill/>
+          <a:extLst>
+            <a:ext uri="{909E8E84-426E-40DD-AFC4-6F175D3DCCD1}">
+              <a14:hiddenFill xmlns:a14="http://schemas.microsoft.com/office/drawing/2010/main">
+                <a:solidFill>
+                  <a:srgbClr val="FFFFFF"/>
+                </a:solidFill>
+              </a14:hiddenFill>
+            </a:ext>
+          </a:extLst>
+        </p:spPr>
+      </p:pic>
+    </p:spTree>
+    <p:extLst>
+      <p:ext uri="{BB962C8B-B14F-4D97-AF65-F5344CB8AC3E}">
+        <p14:creationId xmlns:p14="http://schemas.microsoft.com/office/powerpoint/2010/main" val="4039181795"/>
+      </p:ext>
+    </p:extLst>
+  </p:cSld>
+  <p:clrMapOvr>
+    <a:masterClrMapping/>
+  </p:clrMapOvr>
+</p:sld>
+</file>
+
+<file path=ppt/slides/slide11.xml><?xml version="1.0" encoding="utf-8"?>
+<p:sld xmlns:a="http://schemas.openxmlformats.org/drawingml/2006/main" xmlns:r="http://schemas.openxmlformats.org/officeDocument/2006/relationships" xmlns:p="http://schemas.openxmlformats.org/presentationml/2006/main">
+  <p:cSld>
+    <p:spTree>
+      <p:nvGrpSpPr>
+        <p:cNvPr id="1" name=""/>
+        <p:cNvGrpSpPr/>
+        <p:nvPr/>
+      </p:nvGrpSpPr>
+      <p:grpSpPr>
+        <a:xfrm>
+          <a:off x="0" y="0"/>
+          <a:ext cx="0" cy="0"/>
+          <a:chOff x="0" y="0"/>
+          <a:chExt cx="0" cy="0"/>
+        </a:xfrm>
+      </p:grpSpPr>
+      <p:sp>
+        <p:nvSpPr>
+          <p:cNvPr id="2" name="Title 1"/>
+          <p:cNvSpPr>
+            <a:spLocks noGrp="1"/>
+          </p:cNvSpPr>
+          <p:nvPr>
+            <p:ph type="title"/>
+          </p:nvPr>
+        </p:nvSpPr>
+        <p:spPr/>
+        <p:txBody>
+          <a:bodyPr/>
+          <a:lstStyle/>
+          <a:p>
+            <a:r>
+              <a:rPr lang="bg-BG" dirty="0" smtClean="0"/>
+              <a:t>Обединение на резултати</a:t>
+            </a:r>
+            <a:endParaRPr lang="en-US" dirty="0"/>
+          </a:p>
+        </p:txBody>
+      </p:sp>
+      <p:sp>
+        <p:nvSpPr>
+          <p:cNvPr id="3" name="Content Placeholder 2"/>
+          <p:cNvSpPr>
+            <a:spLocks noGrp="1"/>
+          </p:cNvSpPr>
+          <p:nvPr>
+            <p:ph sz="quarter" idx="13"/>
+          </p:nvPr>
+        </p:nvSpPr>
+        <p:spPr/>
+        <p:txBody>
+          <a:bodyPr/>
+          <a:lstStyle/>
+          <a:p>
+            <a:r>
+              <a:rPr lang="bg-BG" dirty="0" smtClean="0"/>
+              <a:t>Резултатите от различни </a:t>
+            </a:r>
+            <a:r>
+              <a:rPr lang="en-US" dirty="0" smtClean="0"/>
+              <a:t>select </a:t>
+            </a:r>
+            <a:r>
+              <a:rPr lang="bg-BG" dirty="0" smtClean="0"/>
+              <a:t>заявки могат да се обединяват</a:t>
+            </a:r>
+          </a:p>
+          <a:p>
+            <a:r>
+              <a:rPr lang="bg-BG" dirty="0" smtClean="0"/>
+              <a:t>Резултатите могат да бъдат както от една и съща таблица така и от </a:t>
+            </a:r>
+            <a:r>
+              <a:rPr lang="bg-BG" dirty="0" err="1" smtClean="0"/>
+              <a:t>ралични</a:t>
+            </a:r>
+            <a:endParaRPr lang="bg-BG" dirty="0" smtClean="0"/>
+          </a:p>
+          <a:p>
+            <a:r>
+              <a:rPr lang="bg-BG" dirty="0" smtClean="0"/>
+              <a:t>Често пъти при обединението на резултати от различни таблици се използват псевдоними</a:t>
+            </a:r>
+            <a:endParaRPr lang="en-US" dirty="0"/>
+          </a:p>
+        </p:txBody>
+      </p:sp>
+    </p:spTree>
+    <p:extLst>
+      <p:ext uri="{BB962C8B-B14F-4D97-AF65-F5344CB8AC3E}">
+        <p14:creationId xmlns:p14="http://schemas.microsoft.com/office/powerpoint/2010/main" val="29415932"/>
+      </p:ext>
+    </p:extLst>
+  </p:cSld>
+  <p:clrMapOvr>
+    <a:masterClrMapping/>
+  </p:clrMapOvr>
+</p:sld>
+</file>
+
+<file path=ppt/slides/slide12.xml><?xml version="1.0" encoding="utf-8"?>
+<p:sld xmlns:a="http://schemas.openxmlformats.org/drawingml/2006/main" xmlns:r="http://schemas.openxmlformats.org/officeDocument/2006/relationships" xmlns:p="http://schemas.openxmlformats.org/presentationml/2006/main">
+  <p:cSld>
+    <p:spTree>
+      <p:nvGrpSpPr>
+        <p:cNvPr id="1" name=""/>
+        <p:cNvGrpSpPr/>
+        <p:nvPr/>
+      </p:nvGrpSpPr>
+      <p:grpSpPr>
+        <a:xfrm>
+          <a:off x="0" y="0"/>
+          <a:ext cx="0" cy="0"/>
+          <a:chOff x="0" y="0"/>
+          <a:chExt cx="0" cy="0"/>
+        </a:xfrm>
+      </p:grpSpPr>
+      <p:sp>
+        <p:nvSpPr>
+          <p:cNvPr id="2" name="Title 1"/>
+          <p:cNvSpPr>
+            <a:spLocks noGrp="1"/>
+          </p:cNvSpPr>
+          <p:nvPr>
+            <p:ph type="title"/>
+          </p:nvPr>
+        </p:nvSpPr>
+        <p:spPr/>
+        <p:txBody>
+          <a:bodyPr/>
+          <a:lstStyle/>
+          <a:p>
+            <a:r>
+              <a:rPr lang="bg-BG" dirty="0"/>
+              <a:t>Обединение на </a:t>
+            </a:r>
+            <a:r>
+              <a:rPr lang="bg-BG" dirty="0" smtClean="0"/>
+              <a:t>резултати демо</a:t>
+            </a:r>
+            <a:endParaRPr lang="en-US" dirty="0"/>
+          </a:p>
+        </p:txBody>
+      </p:sp>
+      <p:pic>
+        <p:nvPicPr>
+          <p:cNvPr id="5122" name="Picture 2" descr="http://www.gplivna.eu/papers/sql_set_operators_files/04_sql_union.gif"/>
+          <p:cNvPicPr>
+            <a:picLocks noChangeAspect="1" noChangeArrowheads="1"/>
+          </p:cNvPicPr>
+          <p:nvPr/>
+        </p:nvPicPr>
+        <p:blipFill>
+          <a:blip r:embed="rId2">
+            <a:extLst>
+              <a:ext uri="{28A0092B-C50C-407E-A947-70E740481C1C}">
+                <a14:useLocalDpi xmlns:a14="http://schemas.microsoft.com/office/drawing/2010/main" val="0"/>
+              </a:ext>
+            </a:extLst>
+          </a:blip>
+          <a:srcRect/>
+          <a:stretch>
+            <a:fillRect/>
+          </a:stretch>
+        </p:blipFill>
+        <p:spPr bwMode="auto">
+          <a:xfrm>
+            <a:off x="3336336" y="2214694"/>
+            <a:ext cx="5519327" cy="3612652"/>
+          </a:xfrm>
+          <a:prstGeom prst="rect">
+            <a:avLst/>
+          </a:prstGeom>
+          <a:noFill/>
+          <a:extLst>
+            <a:ext uri="{909E8E84-426E-40DD-AFC4-6F175D3DCCD1}">
+              <a14:hiddenFill xmlns:a14="http://schemas.microsoft.com/office/drawing/2010/main">
+                <a:solidFill>
+                  <a:srgbClr val="FFFFFF"/>
+                </a:solidFill>
+              </a14:hiddenFill>
+            </a:ext>
+          </a:extLst>
+        </p:spPr>
+      </p:pic>
+    </p:spTree>
+    <p:extLst>
+      <p:ext uri="{BB962C8B-B14F-4D97-AF65-F5344CB8AC3E}">
+        <p14:creationId xmlns:p14="http://schemas.microsoft.com/office/powerpoint/2010/main" val="1147340774"/>
+      </p:ext>
+    </p:extLst>
+  </p:cSld>
+  <p:clrMapOvr>
+    <a:masterClrMapping/>
+  </p:clrMapOvr>
+</p:sld>
+</file>
+
+<file path=ppt/slides/slide13.xml><?xml version="1.0" encoding="utf-8"?>
+<p:sld xmlns:a="http://schemas.openxmlformats.org/drawingml/2006/main" xmlns:r="http://schemas.openxmlformats.org/officeDocument/2006/relationships" xmlns:p="http://schemas.openxmlformats.org/presentationml/2006/main">
+  <p:cSld>
+    <p:spTree>
+      <p:nvGrpSpPr>
+        <p:cNvPr id="1" name=""/>
+        <p:cNvGrpSpPr/>
+        <p:nvPr/>
+      </p:nvGrpSpPr>
+      <p:grpSpPr>
+        <a:xfrm>
+          <a:off x="0" y="0"/>
+          <a:ext cx="0" cy="0"/>
+          <a:chOff x="0" y="0"/>
+          <a:chExt cx="0" cy="0"/>
+        </a:xfrm>
+      </p:grpSpPr>
+      <p:sp>
+        <p:nvSpPr>
+          <p:cNvPr id="2" name="Title 1"/>
+          <p:cNvSpPr>
+            <a:spLocks noGrp="1"/>
+          </p:cNvSpPr>
+          <p:nvPr>
+            <p:ph type="title"/>
+          </p:nvPr>
+        </p:nvSpPr>
+        <p:spPr/>
+        <p:txBody>
+          <a:bodyPr/>
+          <a:lstStyle/>
+          <a:p>
+            <a:r>
+              <a:rPr lang="en-US" dirty="0" err="1" smtClean="0"/>
+              <a:t>Mysql</a:t>
+            </a:r>
+            <a:r>
+              <a:rPr lang="en-US" dirty="0" smtClean="0"/>
+              <a:t> join</a:t>
+            </a:r>
+            <a:endParaRPr lang="en-US" dirty="0"/>
+          </a:p>
+        </p:txBody>
+      </p:sp>
+      <p:sp>
+        <p:nvSpPr>
+          <p:cNvPr id="3" name="Content Placeholder 2"/>
+          <p:cNvSpPr>
+            <a:spLocks noGrp="1"/>
+          </p:cNvSpPr>
+          <p:nvPr>
+            <p:ph sz="quarter" idx="13"/>
+          </p:nvPr>
+        </p:nvSpPr>
+        <p:spPr/>
+        <p:txBody>
+          <a:bodyPr>
+            <a:normAutofit lnSpcReduction="10000"/>
+          </a:bodyPr>
+          <a:lstStyle/>
+          <a:p>
+            <a:r>
+              <a:rPr lang="en-US" dirty="0" smtClean="0"/>
+              <a:t>Join</a:t>
+            </a:r>
+            <a:r>
+              <a:rPr lang="bg-BG" dirty="0" smtClean="0"/>
+              <a:t> </a:t>
+            </a:r>
+            <a:r>
+              <a:rPr lang="bg-BG" dirty="0"/>
+              <a:t>служи за извеждане на един ред резултатите от 2 </a:t>
+            </a:r>
+            <a:r>
+              <a:rPr lang="bg-BG" dirty="0" smtClean="0"/>
+              <a:t>таблици</a:t>
+            </a:r>
+            <a:endParaRPr lang="bg-BG" dirty="0"/>
+          </a:p>
+          <a:p>
+            <a:pPr marL="0" indent="0">
+              <a:buNone/>
+            </a:pPr>
+            <a:r>
+              <a:rPr lang="bg-BG" dirty="0"/>
+              <a:t>На един ред</a:t>
+            </a:r>
+          </a:p>
+          <a:p>
+            <a:r>
+              <a:rPr lang="en-US" dirty="0" smtClean="0"/>
+              <a:t>Join </a:t>
+            </a:r>
+            <a:r>
+              <a:rPr lang="bg-BG" dirty="0" smtClean="0"/>
+              <a:t>създава поредица от резултати комбиниращи колоните на таблиците които използваме</a:t>
+            </a:r>
+          </a:p>
+          <a:p>
+            <a:r>
+              <a:rPr lang="en-US" dirty="0" smtClean="0"/>
+              <a:t>Join </a:t>
+            </a:r>
+            <a:r>
+              <a:rPr lang="bg-BG" dirty="0" smtClean="0"/>
+              <a:t>използван самостоятелно представлява </a:t>
+            </a:r>
+            <a:r>
+              <a:rPr lang="en-US" dirty="0" smtClean="0"/>
+              <a:t>inner join</a:t>
+            </a:r>
+            <a:endParaRPr lang="bg-BG" dirty="0" smtClean="0"/>
+          </a:p>
+          <a:p>
+            <a:r>
+              <a:rPr lang="bg-BG" dirty="0" smtClean="0"/>
+              <a:t>Извеждат се резултати за които има записи и в двете таблици</a:t>
+            </a:r>
+          </a:p>
+          <a:p>
+            <a:r>
+              <a:rPr lang="en-US" dirty="0" smtClean="0"/>
+              <a:t>Join </a:t>
+            </a:r>
+            <a:r>
+              <a:rPr lang="bg-BG" dirty="0" smtClean="0"/>
+              <a:t>помага за извеждането на цялостната информация за записите в базата данни</a:t>
+            </a:r>
+            <a:r>
+              <a:rPr lang="en-US" dirty="0" smtClean="0"/>
+              <a:t> </a:t>
+            </a:r>
+            <a:endParaRPr lang="bg-BG" dirty="0" smtClean="0"/>
+          </a:p>
+          <a:p>
+            <a:pPr marL="0" indent="0">
+              <a:buNone/>
+            </a:pPr>
+            <a:endParaRPr lang="bg-BG" dirty="0" smtClean="0"/>
+          </a:p>
+        </p:txBody>
+      </p:sp>
+    </p:spTree>
+    <p:extLst>
+      <p:ext uri="{BB962C8B-B14F-4D97-AF65-F5344CB8AC3E}">
+        <p14:creationId xmlns:p14="http://schemas.microsoft.com/office/powerpoint/2010/main" val="4012257003"/>
+      </p:ext>
+    </p:extLst>
+  </p:cSld>
+  <p:clrMapOvr>
+    <a:masterClrMapping/>
+  </p:clrMapOvr>
+</p:sld>
+</file>
+
+<file path=ppt/slides/slide14.xml><?xml version="1.0" encoding="utf-8"?>
+<p:sld xmlns:a="http://schemas.openxmlformats.org/drawingml/2006/main" xmlns:r="http://schemas.openxmlformats.org/officeDocument/2006/relationships" xmlns:p="http://schemas.openxmlformats.org/presentationml/2006/main">
+  <p:cSld>
+    <p:spTree>
+      <p:nvGrpSpPr>
+        <p:cNvPr id="1" name=""/>
+        <p:cNvGrpSpPr/>
+        <p:nvPr/>
+      </p:nvGrpSpPr>
+      <p:grpSpPr>
+        <a:xfrm>
+          <a:off x="0" y="0"/>
+          <a:ext cx="0" cy="0"/>
+          <a:chOff x="0" y="0"/>
+          <a:chExt cx="0" cy="0"/>
+        </a:xfrm>
+      </p:grpSpPr>
+      <p:sp>
+        <p:nvSpPr>
+          <p:cNvPr id="2" name="Title 1"/>
+          <p:cNvSpPr>
+            <a:spLocks noGrp="1"/>
+          </p:cNvSpPr>
+          <p:nvPr>
+            <p:ph type="title"/>
+          </p:nvPr>
+        </p:nvSpPr>
+        <p:spPr/>
+        <p:txBody>
+          <a:bodyPr/>
+          <a:lstStyle/>
+          <a:p>
+            <a:r>
+              <a:rPr lang="en-US" dirty="0" err="1"/>
+              <a:t>Mysql</a:t>
+            </a:r>
+            <a:r>
+              <a:rPr lang="en-US" dirty="0"/>
+              <a:t> join</a:t>
+            </a:r>
+          </a:p>
+        </p:txBody>
+      </p:sp>
+      <p:pic>
+        <p:nvPicPr>
+          <p:cNvPr id="6146" name="Picture 2" descr="http://blog.codinghorror.com/content/images/uploads/2007/10/6a0120a85dcdae970b012877702769970c-pi.png"/>
+          <p:cNvPicPr>
+            <a:picLocks noChangeAspect="1" noChangeArrowheads="1"/>
+          </p:cNvPicPr>
+          <p:nvPr/>
+        </p:nvPicPr>
+        <p:blipFill>
+          <a:blip r:embed="rId2">
+            <a:extLst>
+              <a:ext uri="{28A0092B-C50C-407E-A947-70E740481C1C}">
+                <a14:useLocalDpi xmlns:a14="http://schemas.microsoft.com/office/drawing/2010/main" val="0"/>
+              </a:ext>
+            </a:extLst>
+          </a:blip>
+          <a:srcRect/>
+          <a:stretch>
+            <a:fillRect/>
+          </a:stretch>
+        </p:blipFill>
+        <p:spPr bwMode="auto">
+          <a:xfrm>
+            <a:off x="3139168" y="2214694"/>
+            <a:ext cx="6041824" cy="3959683"/>
+          </a:xfrm>
+          <a:prstGeom prst="rect">
+            <a:avLst/>
+          </a:prstGeom>
+          <a:noFill/>
+          <a:extLst>
+            <a:ext uri="{909E8E84-426E-40DD-AFC4-6F175D3DCCD1}">
+              <a14:hiddenFill xmlns:a14="http://schemas.microsoft.com/office/drawing/2010/main">
+                <a:solidFill>
+                  <a:srgbClr val="FFFFFF"/>
+                </a:solidFill>
+              </a14:hiddenFill>
+            </a:ext>
+          </a:extLst>
+        </p:spPr>
+      </p:pic>
+      <p:pic>
+        <p:nvPicPr>
+          <p:cNvPr id="5" name="Picture 2" descr="http://blog.codinghorror.com/content/images/uploads/2007/10/6a0120a85dcdae970b012877702769970c-pi.png"/>
+          <p:cNvPicPr>
+            <a:picLocks noChangeAspect="1" noChangeArrowheads="1"/>
+          </p:cNvPicPr>
+          <p:nvPr/>
+        </p:nvPicPr>
+        <p:blipFill>
+          <a:blip r:embed="rId2">
+            <a:extLst>
+              <a:ext uri="{28A0092B-C50C-407E-A947-70E740481C1C}">
+                <a14:useLocalDpi xmlns:a14="http://schemas.microsoft.com/office/drawing/2010/main" val="0"/>
+              </a:ext>
+            </a:extLst>
+          </a:blip>
+          <a:srcRect/>
+          <a:stretch>
+            <a:fillRect/>
+          </a:stretch>
+        </p:blipFill>
+        <p:spPr bwMode="auto">
+          <a:xfrm>
+            <a:off x="3075088" y="2153734"/>
+            <a:ext cx="6041824" cy="3959683"/>
+          </a:xfrm>
+          <a:prstGeom prst="rect">
+            <a:avLst/>
+          </a:prstGeom>
+          <a:noFill/>
+          <a:extLst>
+            <a:ext uri="{909E8E84-426E-40DD-AFC4-6F175D3DCCD1}">
+              <a14:hiddenFill xmlns:a14="http://schemas.microsoft.com/office/drawing/2010/main">
+                <a:solidFill>
+                  <a:srgbClr val="FFFFFF"/>
+                </a:solidFill>
+              </a14:hiddenFill>
+            </a:ext>
+          </a:extLst>
+        </p:spPr>
+      </p:pic>
+    </p:spTree>
+    <p:extLst>
+      <p:ext uri="{BB962C8B-B14F-4D97-AF65-F5344CB8AC3E}">
+        <p14:creationId xmlns:p14="http://schemas.microsoft.com/office/powerpoint/2010/main" val="3117488895"/>
+      </p:ext>
+    </p:extLst>
+  </p:cSld>
+  <p:clrMapOvr>
+    <a:masterClrMapping/>
+  </p:clrMapOvr>
+</p:sld>
+</file>
+
+<file path=ppt/slides/slide15.xml><?xml version="1.0" encoding="utf-8"?>
+<p:sld xmlns:a="http://schemas.openxmlformats.org/drawingml/2006/main" xmlns:r="http://schemas.openxmlformats.org/officeDocument/2006/relationships" xmlns:p="http://schemas.openxmlformats.org/presentationml/2006/main">
+  <p:cSld>
+    <p:spTree>
+      <p:nvGrpSpPr>
+        <p:cNvPr id="1" name=""/>
+        <p:cNvGrpSpPr/>
+        <p:nvPr/>
+      </p:nvGrpSpPr>
+      <p:grpSpPr>
+        <a:xfrm>
+          <a:off x="0" y="0"/>
+          <a:ext cx="0" cy="0"/>
+          <a:chOff x="0" y="0"/>
+          <a:chExt cx="0" cy="0"/>
+        </a:xfrm>
+      </p:grpSpPr>
+      <p:sp>
+        <p:nvSpPr>
+          <p:cNvPr id="2" name="Title 1"/>
+          <p:cNvSpPr>
+            <a:spLocks noGrp="1"/>
+          </p:cNvSpPr>
+          <p:nvPr>
+            <p:ph type="title"/>
+          </p:nvPr>
+        </p:nvSpPr>
+        <p:spPr/>
+        <p:txBody>
+          <a:bodyPr/>
+          <a:lstStyle/>
+          <a:p>
+            <a:r>
+              <a:rPr lang="en-US" dirty="0" err="1" smtClean="0"/>
+              <a:t>Mysql</a:t>
+            </a:r>
+            <a:r>
+              <a:rPr lang="en-US" dirty="0" smtClean="0"/>
+              <a:t> left join</a:t>
+            </a:r>
+            <a:endParaRPr lang="en-US" dirty="0"/>
+          </a:p>
+        </p:txBody>
+      </p:sp>
+      <p:sp>
+        <p:nvSpPr>
+          <p:cNvPr id="3" name="Content Placeholder 2"/>
+          <p:cNvSpPr>
+            <a:spLocks noGrp="1"/>
+          </p:cNvSpPr>
+          <p:nvPr>
+            <p:ph sz="quarter" idx="13"/>
+          </p:nvPr>
+        </p:nvSpPr>
+        <p:spPr/>
+        <p:txBody>
+          <a:bodyPr/>
+          <a:lstStyle/>
+          <a:p>
+            <a:r>
+              <a:rPr lang="bg-BG" dirty="0" smtClean="0"/>
+              <a:t>Извеждат се всички резултати от </a:t>
+            </a:r>
+            <a:r>
+              <a:rPr lang="bg-BG" b="1" dirty="0" smtClean="0"/>
+              <a:t>главната</a:t>
+            </a:r>
+            <a:r>
+              <a:rPr lang="bg-BG" dirty="0" smtClean="0"/>
+              <a:t> таблица отговарящи на условието</a:t>
+            </a:r>
+          </a:p>
+          <a:p>
+            <a:r>
+              <a:rPr lang="bg-BG" dirty="0" smtClean="0"/>
+              <a:t>Ако няма записи в </a:t>
+            </a:r>
+            <a:r>
+              <a:rPr lang="bg-BG" b="1" dirty="0" smtClean="0"/>
+              <a:t>присъединената</a:t>
+            </a:r>
+            <a:r>
+              <a:rPr lang="bg-BG" dirty="0" smtClean="0"/>
+              <a:t> таблица на мястото на полетата от нея се връща </a:t>
+            </a:r>
+            <a:r>
+              <a:rPr lang="en-US" dirty="0" smtClean="0"/>
+              <a:t>NULL</a:t>
+            </a:r>
+            <a:endParaRPr lang="en-US" dirty="0"/>
+          </a:p>
+        </p:txBody>
+      </p:sp>
+    </p:spTree>
+    <p:extLst>
+      <p:ext uri="{BB962C8B-B14F-4D97-AF65-F5344CB8AC3E}">
+        <p14:creationId xmlns:p14="http://schemas.microsoft.com/office/powerpoint/2010/main" val="2757198404"/>
+      </p:ext>
+    </p:extLst>
+  </p:cSld>
+  <p:clrMapOvr>
+    <a:masterClrMapping/>
+  </p:clrMapOvr>
+</p:sld>
+</file>
+
+<file path=ppt/slides/slide16.xml><?xml version="1.0" encoding="utf-8"?>
+<p:sld xmlns:a="http://schemas.openxmlformats.org/drawingml/2006/main" xmlns:r="http://schemas.openxmlformats.org/officeDocument/2006/relationships" xmlns:p="http://schemas.openxmlformats.org/presentationml/2006/main">
+  <p:cSld>
+    <p:spTree>
+      <p:nvGrpSpPr>
+        <p:cNvPr id="1" name=""/>
+        <p:cNvGrpSpPr/>
+        <p:nvPr/>
+      </p:nvGrpSpPr>
+      <p:grpSpPr>
+        <a:xfrm>
+          <a:off x="0" y="0"/>
+          <a:ext cx="0" cy="0"/>
+          <a:chOff x="0" y="0"/>
+          <a:chExt cx="0" cy="0"/>
+        </a:xfrm>
+      </p:grpSpPr>
+      <p:sp>
+        <p:nvSpPr>
+          <p:cNvPr id="2" name="Title 1"/>
+          <p:cNvSpPr>
+            <a:spLocks noGrp="1"/>
+          </p:cNvSpPr>
+          <p:nvPr>
+            <p:ph type="title"/>
+          </p:nvPr>
+        </p:nvSpPr>
+        <p:spPr/>
+        <p:txBody>
+          <a:bodyPr/>
+          <a:lstStyle/>
+          <a:p>
+            <a:r>
+              <a:rPr lang="en-US" dirty="0" err="1"/>
+              <a:t>Mysql</a:t>
+            </a:r>
+            <a:r>
+              <a:rPr lang="en-US" dirty="0"/>
+              <a:t> left </a:t>
+            </a:r>
+            <a:r>
+              <a:rPr lang="en-US" dirty="0" smtClean="0"/>
+              <a:t>join</a:t>
+            </a:r>
+            <a:r>
+              <a:rPr lang="bg-BG" dirty="0" smtClean="0"/>
+              <a:t> демо</a:t>
+            </a:r>
+            <a:endParaRPr lang="en-US" dirty="0"/>
+          </a:p>
+        </p:txBody>
+      </p:sp>
+      <p:pic>
+        <p:nvPicPr>
+          <p:cNvPr id="7170" name="Picture 2" descr="http://blog.codinghorror.com/content/images/uploads/2007/10/6a0120a85dcdae970b01287770273e970c-pi.png"/>
+          <p:cNvPicPr>
+            <a:picLocks noChangeAspect="1" noChangeArrowheads="1"/>
+          </p:cNvPicPr>
+          <p:nvPr/>
+        </p:nvPicPr>
+        <p:blipFill>
+          <a:blip r:embed="rId2">
+            <a:extLst>
+              <a:ext uri="{28A0092B-C50C-407E-A947-70E740481C1C}">
+                <a14:useLocalDpi xmlns:a14="http://schemas.microsoft.com/office/drawing/2010/main" val="0"/>
+              </a:ext>
+            </a:extLst>
+          </a:blip>
+          <a:srcRect/>
+          <a:stretch>
+            <a:fillRect/>
+          </a:stretch>
+        </p:blipFill>
+        <p:spPr bwMode="auto">
+          <a:xfrm>
+            <a:off x="3705225" y="2214694"/>
+            <a:ext cx="4781550" cy="3133726"/>
+          </a:xfrm>
+          <a:prstGeom prst="rect">
+            <a:avLst/>
+          </a:prstGeom>
+          <a:noFill/>
+          <a:extLst>
+            <a:ext uri="{909E8E84-426E-40DD-AFC4-6F175D3DCCD1}">
+              <a14:hiddenFill xmlns:a14="http://schemas.microsoft.com/office/drawing/2010/main">
+                <a:solidFill>
+                  <a:srgbClr val="FFFFFF"/>
+                </a:solidFill>
+              </a14:hiddenFill>
+            </a:ext>
+          </a:extLst>
+        </p:spPr>
+      </p:pic>
+    </p:spTree>
+    <p:extLst>
+      <p:ext uri="{BB962C8B-B14F-4D97-AF65-F5344CB8AC3E}">
+        <p14:creationId xmlns:p14="http://schemas.microsoft.com/office/powerpoint/2010/main" val="1646435728"/>
+      </p:ext>
+    </p:extLst>
+  </p:cSld>
+  <p:clrMapOvr>
+    <a:masterClrMapping/>
+  </p:clrMapOvr>
+</p:sld>
+</file>
+
+<file path=ppt/slides/slide17.xml><?xml version="1.0" encoding="utf-8"?>
+<p:sld xmlns:a="http://schemas.openxmlformats.org/drawingml/2006/main" xmlns:r="http://schemas.openxmlformats.org/officeDocument/2006/relationships" xmlns:p="http://schemas.openxmlformats.org/presentationml/2006/main">
+  <p:cSld>
+    <p:spTree>
+      <p:nvGrpSpPr>
+        <p:cNvPr id="1" name=""/>
+        <p:cNvGrpSpPr/>
+        <p:nvPr/>
+      </p:nvGrpSpPr>
+      <p:grpSpPr>
+        <a:xfrm>
+          <a:off x="0" y="0"/>
+          <a:ext cx="0" cy="0"/>
+          <a:chOff x="0" y="0"/>
+          <a:chExt cx="0" cy="0"/>
+        </a:xfrm>
+      </p:grpSpPr>
+      <p:sp>
+        <p:nvSpPr>
+          <p:cNvPr id="2" name="Title 1"/>
+          <p:cNvSpPr>
+            <a:spLocks noGrp="1"/>
+          </p:cNvSpPr>
+          <p:nvPr>
+            <p:ph type="title"/>
+          </p:nvPr>
+        </p:nvSpPr>
+        <p:spPr/>
+        <p:txBody>
+          <a:bodyPr/>
+          <a:lstStyle/>
+          <a:p>
+            <a:r>
+              <a:rPr lang="en-US" dirty="0" err="1"/>
+              <a:t>Mysql</a:t>
+            </a:r>
+            <a:r>
+              <a:rPr lang="en-US" dirty="0"/>
+              <a:t> </a:t>
+            </a:r>
+            <a:r>
+              <a:rPr lang="en-US" dirty="0" smtClean="0"/>
+              <a:t>RIGHT </a:t>
+            </a:r>
+            <a:r>
+              <a:rPr lang="en-US" dirty="0"/>
+              <a:t>join</a:t>
+            </a:r>
+          </a:p>
+        </p:txBody>
+      </p:sp>
+      <p:sp>
+        <p:nvSpPr>
+          <p:cNvPr id="3" name="Content Placeholder 2"/>
+          <p:cNvSpPr>
+            <a:spLocks noGrp="1"/>
+          </p:cNvSpPr>
+          <p:nvPr>
+            <p:ph sz="quarter" idx="13"/>
+          </p:nvPr>
+        </p:nvSpPr>
+        <p:spPr/>
+        <p:txBody>
+          <a:bodyPr/>
+          <a:lstStyle/>
+          <a:p>
+            <a:r>
+              <a:rPr lang="bg-BG" dirty="0"/>
+              <a:t>Извеждат се всички резултати от </a:t>
+            </a:r>
+            <a:r>
+              <a:rPr lang="bg-BG" b="1" dirty="0" smtClean="0"/>
+              <a:t>присъединената</a:t>
+            </a:r>
+            <a:r>
+              <a:rPr lang="bg-BG" dirty="0" smtClean="0"/>
+              <a:t> таблица </a:t>
+            </a:r>
+            <a:r>
+              <a:rPr lang="bg-BG" dirty="0"/>
+              <a:t>отговарящи на условието</a:t>
+            </a:r>
+          </a:p>
+          <a:p>
+            <a:r>
+              <a:rPr lang="bg-BG" dirty="0"/>
+              <a:t>Ако няма записи в </a:t>
+            </a:r>
+            <a:r>
+              <a:rPr lang="bg-BG" b="1" dirty="0" smtClean="0"/>
+              <a:t>главната</a:t>
+            </a:r>
+            <a:r>
+              <a:rPr lang="bg-BG" dirty="0" smtClean="0"/>
+              <a:t> </a:t>
+            </a:r>
+            <a:r>
+              <a:rPr lang="bg-BG" dirty="0"/>
+              <a:t>таблица на мястото на полетата от нея се връща </a:t>
+            </a:r>
+            <a:r>
+              <a:rPr lang="en-US" dirty="0"/>
+              <a:t>NULL</a:t>
+            </a:r>
+          </a:p>
+          <a:p>
+            <a:endParaRPr lang="en-US" dirty="0"/>
+          </a:p>
+        </p:txBody>
+      </p:sp>
+    </p:spTree>
+    <p:extLst>
+      <p:ext uri="{BB962C8B-B14F-4D97-AF65-F5344CB8AC3E}">
+        <p14:creationId xmlns:p14="http://schemas.microsoft.com/office/powerpoint/2010/main" val="388366210"/>
+      </p:ext>
+    </p:extLst>
+  </p:cSld>
+  <p:clrMapOvr>
+    <a:masterClrMapping/>
+  </p:clrMapOvr>
+</p:sld>
+</file>
+
+<file path=ppt/slides/slide18.xml><?xml version="1.0" encoding="utf-8"?>
+<p:sld xmlns:a="http://schemas.openxmlformats.org/drawingml/2006/main" xmlns:r="http://schemas.openxmlformats.org/officeDocument/2006/relationships" xmlns:p="http://schemas.openxmlformats.org/presentationml/2006/main">
+  <p:cSld>
+    <p:spTree>
+      <p:nvGrpSpPr>
+        <p:cNvPr id="1" name=""/>
+        <p:cNvGrpSpPr/>
+        <p:nvPr/>
+      </p:nvGrpSpPr>
+      <p:grpSpPr>
+        <a:xfrm>
+          <a:off x="0" y="0"/>
+          <a:ext cx="0" cy="0"/>
+          <a:chOff x="0" y="0"/>
+          <a:chExt cx="0" cy="0"/>
+        </a:xfrm>
+      </p:grpSpPr>
+      <p:sp>
+        <p:nvSpPr>
+          <p:cNvPr id="2" name="Title 1"/>
+          <p:cNvSpPr>
+            <a:spLocks noGrp="1"/>
+          </p:cNvSpPr>
+          <p:nvPr>
+            <p:ph type="title"/>
+          </p:nvPr>
+        </p:nvSpPr>
+        <p:spPr/>
+        <p:txBody>
+          <a:bodyPr/>
+          <a:lstStyle/>
+          <a:p>
+            <a:r>
+              <a:rPr lang="en-US" dirty="0" err="1"/>
+              <a:t>Mysql</a:t>
+            </a:r>
+            <a:r>
+              <a:rPr lang="en-US" dirty="0"/>
+              <a:t> </a:t>
+            </a:r>
+            <a:r>
+              <a:rPr lang="en-US" dirty="0" smtClean="0"/>
+              <a:t>right </a:t>
+            </a:r>
+            <a:r>
+              <a:rPr lang="en-US" dirty="0"/>
+              <a:t>join</a:t>
+            </a:r>
+            <a:r>
+              <a:rPr lang="bg-BG" dirty="0"/>
+              <a:t> демо</a:t>
+            </a:r>
+            <a:endParaRPr lang="en-US" dirty="0"/>
+          </a:p>
+        </p:txBody>
+      </p:sp>
+      <p:pic>
+        <p:nvPicPr>
+          <p:cNvPr id="8194" name="Picture 2" descr="http://4.bp.blogspot.com/-pUd6EevPOSw/UG4nrNEhWBI/AAAAAAAAADs/6xJ4ZVgDmw8/s320/right-join-new.jpg"/>
+          <p:cNvPicPr>
+            <a:picLocks noChangeAspect="1" noChangeArrowheads="1"/>
+          </p:cNvPicPr>
+          <p:nvPr/>
+        </p:nvPicPr>
+        <p:blipFill>
+          <a:blip r:embed="rId2">
+            <a:extLst>
+              <a:ext uri="{28A0092B-C50C-407E-A947-70E740481C1C}">
+                <a14:useLocalDpi xmlns:a14="http://schemas.microsoft.com/office/drawing/2010/main" val="0"/>
+              </a:ext>
+            </a:extLst>
+          </a:blip>
+          <a:srcRect/>
+          <a:stretch>
+            <a:fillRect/>
+          </a:stretch>
+        </p:blipFill>
+        <p:spPr bwMode="auto">
+          <a:xfrm>
+            <a:off x="3243353" y="2214694"/>
+            <a:ext cx="5705294" cy="4047195"/>
+          </a:xfrm>
+          <a:prstGeom prst="rect">
+            <a:avLst/>
+          </a:prstGeom>
+          <a:noFill/>
+          <a:extLst>
+            <a:ext uri="{909E8E84-426E-40DD-AFC4-6F175D3DCCD1}">
+              <a14:hiddenFill xmlns:a14="http://schemas.microsoft.com/office/drawing/2010/main">
+                <a:solidFill>
+                  <a:srgbClr val="FFFFFF"/>
+                </a:solidFill>
+              </a14:hiddenFill>
+            </a:ext>
+          </a:extLst>
+        </p:spPr>
+      </p:pic>
+    </p:spTree>
+    <p:extLst>
+      <p:ext uri="{BB962C8B-B14F-4D97-AF65-F5344CB8AC3E}">
+        <p14:creationId xmlns:p14="http://schemas.microsoft.com/office/powerpoint/2010/main" val="1842879374"/>
+      </p:ext>
+    </p:extLst>
+  </p:cSld>
+  <p:clrMapOvr>
+    <a:masterClrMapping/>
+  </p:clrMapOvr>
+</p:sld>
+</file>
+
+<file path=ppt/slides/slide19.xml><?xml version="1.0" encoding="utf-8"?>
+<p:sld xmlns:a="http://schemas.openxmlformats.org/drawingml/2006/main" xmlns:r="http://schemas.openxmlformats.org/officeDocument/2006/relationships" xmlns:p="http://schemas.openxmlformats.org/presentationml/2006/main">
+  <p:cSld>
+    <p:spTree>
+      <p:nvGrpSpPr>
+        <p:cNvPr id="1" name=""/>
+        <p:cNvGrpSpPr/>
+        <p:nvPr/>
+      </p:nvGrpSpPr>
+      <p:grpSpPr>
+        <a:xfrm>
+          <a:off x="0" y="0"/>
+          <a:ext cx="0" cy="0"/>
+          <a:chOff x="0" y="0"/>
+          <a:chExt cx="0" cy="0"/>
+        </a:xfrm>
+      </p:grpSpPr>
+      <p:sp>
+        <p:nvSpPr>
+          <p:cNvPr id="2" name="Title 1"/>
+          <p:cNvSpPr>
+            <a:spLocks noGrp="1"/>
+          </p:cNvSpPr>
+          <p:nvPr>
+            <p:ph type="title"/>
+          </p:nvPr>
+        </p:nvSpPr>
+        <p:spPr/>
+        <p:txBody>
+          <a:bodyPr/>
+          <a:lstStyle/>
+          <a:p>
+            <a:r>
+              <a:rPr lang="bg-BG" dirty="0" smtClean="0"/>
+              <a:t>Агрегатни функции</a:t>
+            </a:r>
+            <a:endParaRPr lang="en-US" dirty="0"/>
+          </a:p>
+        </p:txBody>
+      </p:sp>
+      <p:sp>
+        <p:nvSpPr>
+          <p:cNvPr id="3" name="Content Placeholder 2"/>
+          <p:cNvSpPr>
+            <a:spLocks noGrp="1"/>
+          </p:cNvSpPr>
+          <p:nvPr>
+            <p:ph sz="quarter" idx="13"/>
+          </p:nvPr>
+        </p:nvSpPr>
+        <p:spPr/>
+        <p:txBody>
+          <a:bodyPr/>
+          <a:lstStyle/>
+          <a:p>
+            <a:r>
+              <a:rPr lang="bg-BG" dirty="0" smtClean="0"/>
+              <a:t>С помощта на агрегатните функции можем да изчисляваме различни статистики за множества от стойности</a:t>
+            </a:r>
+          </a:p>
+          <a:p>
+            <a:r>
+              <a:rPr lang="en-US" dirty="0" smtClean="0"/>
+              <a:t>Group by </a:t>
+            </a:r>
+            <a:r>
+              <a:rPr lang="bg-BG" dirty="0" smtClean="0"/>
+              <a:t>помага за групиране на резултатите – така избираме колона на чиято база да стане изчислението на </a:t>
+            </a:r>
+            <a:r>
+              <a:rPr lang="bg-BG" dirty="0" err="1" smtClean="0"/>
+              <a:t>статис</a:t>
+            </a:r>
+            <a:r>
+              <a:rPr lang="en-US" dirty="0" smtClean="0"/>
+              <a:t>t</a:t>
+            </a:r>
+            <a:r>
+              <a:rPr lang="bg-BG" dirty="0" err="1" smtClean="0"/>
+              <a:t>иката</a:t>
+            </a:r>
+            <a:endParaRPr lang="bg-BG" dirty="0" smtClean="0"/>
+          </a:p>
+          <a:p>
+            <a:r>
+              <a:rPr lang="bg-BG" dirty="0" smtClean="0"/>
+              <a:t>Функции: </a:t>
+            </a:r>
+            <a:r>
+              <a:rPr lang="en-US" dirty="0" smtClean="0"/>
+              <a:t>sum, </a:t>
+            </a:r>
+            <a:r>
+              <a:rPr lang="en-US" dirty="0" err="1" smtClean="0"/>
+              <a:t>avg</a:t>
+            </a:r>
+            <a:r>
+              <a:rPr lang="en-US" dirty="0" smtClean="0"/>
+              <a:t>, count, min, max</a:t>
+            </a:r>
+            <a:endParaRPr lang="en-US" dirty="0"/>
+          </a:p>
+        </p:txBody>
+      </p:sp>
+    </p:spTree>
+    <p:extLst>
+      <p:ext uri="{BB962C8B-B14F-4D97-AF65-F5344CB8AC3E}">
+        <p14:creationId xmlns:p14="http://schemas.microsoft.com/office/powerpoint/2010/main" val="3884012569"/>
+      </p:ext>
+    </p:extLst>
+  </p:cSld>
+  <p:clrMapOvr>
+    <a:masterClrMapping/>
+  </p:clrMapOvr>
+</p:sld>
+</file>
+
 <file path=ppt/slides/slide2.xml><?xml version="1.0" encoding="utf-8"?>
 <p:sld xmlns:a="http://schemas.openxmlformats.org/drawingml/2006/main" xmlns:r="http://schemas.openxmlformats.org/officeDocument/2006/relationships" xmlns:p="http://schemas.openxmlformats.org/presentationml/2006/main">
   <p:cSld>
@@ -6580,6 +7750,14 @@
           <a:bodyPr/>
           <a:lstStyle/>
           <a:p>
+            <a:r>
+              <a:rPr lang="en-US" dirty="0" err="1" smtClean="0"/>
+              <a:t>Mysql</a:t>
+            </a:r>
+            <a:r>
+              <a:rPr lang="en-US" dirty="0" smtClean="0"/>
+              <a:t> workbench</a:t>
+            </a:r>
             <a:endParaRPr lang="en-US" dirty="0"/>
           </a:p>
         </p:txBody>
@@ -6599,6 +7777,97 @@
           <a:bodyPr/>
           <a:lstStyle/>
           <a:p>
+            <a:r>
+              <a:rPr lang="en-US" dirty="0" err="1" smtClean="0"/>
+              <a:t>Phpmyadmin</a:t>
+            </a:r>
+            <a:r>
+              <a:rPr lang="bg-BG" dirty="0" smtClean="0"/>
+              <a:t> е добър </a:t>
+            </a:r>
+            <a:r>
+              <a:rPr lang="bg-BG" dirty="0" smtClean="0"/>
+              <a:t>за изпробване на заявки но не е много удобен за моделиране на схеми на бази данни</a:t>
+            </a:r>
+          </a:p>
+          <a:p>
+            <a:r>
+              <a:rPr lang="en-US" dirty="0" err="1" smtClean="0"/>
+              <a:t>Mysql</a:t>
+            </a:r>
+            <a:r>
+              <a:rPr lang="en-US" dirty="0" smtClean="0"/>
+              <a:t> workbench</a:t>
+            </a:r>
+            <a:r>
+              <a:rPr lang="bg-BG" dirty="0" smtClean="0"/>
+              <a:t> представлява мощен помощник при моделирането и работа с </a:t>
+            </a:r>
+            <a:r>
+              <a:rPr lang="en-US" dirty="0" err="1" smtClean="0"/>
+              <a:t>Mysql</a:t>
+            </a:r>
+            <a:endParaRPr lang="bg-BG" dirty="0" smtClean="0"/>
+          </a:p>
+          <a:p>
+            <a:r>
+              <a:rPr lang="bg-BG" dirty="0" smtClean="0"/>
+              <a:t>Подържа всички видове връзки между базите</a:t>
+            </a:r>
+          </a:p>
+          <a:p>
+            <a:r>
+              <a:rPr lang="bg-BG" dirty="0" smtClean="0"/>
+              <a:t>Поддържа генериране на </a:t>
+            </a:r>
+            <a:r>
+              <a:rPr lang="en-US" dirty="0" err="1" smtClean="0"/>
+              <a:t>sql</a:t>
+            </a:r>
+            <a:r>
+              <a:rPr lang="en-US" dirty="0" smtClean="0"/>
+              <a:t> </a:t>
+            </a:r>
+            <a:r>
+              <a:rPr lang="bg-BG" dirty="0" smtClean="0"/>
+              <a:t>и </a:t>
+            </a:r>
+            <a:r>
+              <a:rPr lang="en-US" dirty="0" err="1" smtClean="0"/>
+              <a:t>php</a:t>
+            </a:r>
+            <a:endParaRPr lang="en-US" dirty="0" smtClean="0"/>
+          </a:p>
+          <a:p>
+            <a:r>
+              <a:rPr lang="bg-BG" dirty="0" smtClean="0"/>
+              <a:t>Може да го свалите от:</a:t>
+            </a:r>
+            <a:r>
+              <a:rPr lang="en-US" dirty="0"/>
+              <a:t> </a:t>
+            </a:r>
+            <a:r>
+              <a:rPr lang="en-US" dirty="0">
+                <a:hlinkClick r:id="rId2"/>
+              </a:rPr>
+              <a:t>http://dev.mysql.com/downloads/workbench</a:t>
+            </a:r>
+            <a:r>
+              <a:rPr lang="en-US" dirty="0" smtClean="0">
+                <a:hlinkClick r:id="rId2"/>
+              </a:rPr>
+              <a:t>/</a:t>
+            </a:r>
+            <a:endParaRPr lang="en-US" dirty="0" smtClean="0"/>
+          </a:p>
+          <a:p>
+            <a:endParaRPr lang="bg-BG" dirty="0" smtClean="0"/>
+          </a:p>
+          <a:p>
+            <a:pPr marL="0" indent="0">
+              <a:buNone/>
+            </a:pPr>
             <a:endParaRPr lang="en-US" dirty="0"/>
           </a:p>
         </p:txBody>
@@ -6607,6 +7876,206 @@
     <p:extLst>
       <p:ext uri="{BB962C8B-B14F-4D97-AF65-F5344CB8AC3E}">
         <p14:creationId xmlns:p14="http://schemas.microsoft.com/office/powerpoint/2010/main" val="1499420344"/>
+      </p:ext>
+    </p:extLst>
+  </p:cSld>
+  <p:clrMapOvr>
+    <a:masterClrMapping/>
+  </p:clrMapOvr>
+</p:sld>
+</file>
+
+<file path=ppt/slides/slide20.xml><?xml version="1.0" encoding="utf-8"?>
+<p:sld xmlns:a="http://schemas.openxmlformats.org/drawingml/2006/main" xmlns:r="http://schemas.openxmlformats.org/officeDocument/2006/relationships" xmlns:p="http://schemas.openxmlformats.org/presentationml/2006/main">
+  <p:cSld>
+    <p:spTree>
+      <p:nvGrpSpPr>
+        <p:cNvPr id="1" name=""/>
+        <p:cNvGrpSpPr/>
+        <p:nvPr/>
+      </p:nvGrpSpPr>
+      <p:grpSpPr>
+        <a:xfrm>
+          <a:off x="0" y="0"/>
+          <a:ext cx="0" cy="0"/>
+          <a:chOff x="0" y="0"/>
+          <a:chExt cx="0" cy="0"/>
+        </a:xfrm>
+      </p:grpSpPr>
+      <p:sp>
+        <p:nvSpPr>
+          <p:cNvPr id="2" name="Title 1"/>
+          <p:cNvSpPr>
+            <a:spLocks noGrp="1"/>
+          </p:cNvSpPr>
+          <p:nvPr>
+            <p:ph type="title"/>
+          </p:nvPr>
+        </p:nvSpPr>
+        <p:spPr/>
+        <p:txBody>
+          <a:bodyPr/>
+          <a:lstStyle/>
+          <a:p>
+            <a:r>
+              <a:rPr lang="bg-BG" dirty="0"/>
+              <a:t>Агрегатни </a:t>
+            </a:r>
+            <a:r>
+              <a:rPr lang="bg-BG" dirty="0" smtClean="0"/>
+              <a:t>функции</a:t>
+            </a:r>
+            <a:r>
+              <a:rPr lang="en-US" dirty="0" smtClean="0"/>
+              <a:t> </a:t>
+            </a:r>
+            <a:r>
+              <a:rPr lang="bg-BG" dirty="0" smtClean="0"/>
+              <a:t>демо</a:t>
+            </a:r>
+            <a:endParaRPr lang="en-US" dirty="0"/>
+          </a:p>
+        </p:txBody>
+      </p:sp>
+      <p:pic>
+        <p:nvPicPr>
+          <p:cNvPr id="9218" name="Picture 2" descr="http://www.zentut.com/wp-content/uploads/2012/10/SQL-Aggregate-Function.jpg"/>
+          <p:cNvPicPr>
+            <a:picLocks noChangeAspect="1" noChangeArrowheads="1"/>
+          </p:cNvPicPr>
+          <p:nvPr/>
+        </p:nvPicPr>
+        <p:blipFill>
+          <a:blip r:embed="rId2">
+            <a:extLst>
+              <a:ext uri="{28A0092B-C50C-407E-A947-70E740481C1C}">
+                <a14:useLocalDpi xmlns:a14="http://schemas.microsoft.com/office/drawing/2010/main" val="0"/>
+              </a:ext>
+            </a:extLst>
+          </a:blip>
+          <a:srcRect/>
+          <a:stretch>
+            <a:fillRect/>
+          </a:stretch>
+        </p:blipFill>
+        <p:spPr bwMode="auto">
+          <a:xfrm>
+            <a:off x="2738256" y="2214694"/>
+            <a:ext cx="6715488" cy="3830668"/>
+          </a:xfrm>
+          <a:prstGeom prst="rect">
+            <a:avLst/>
+          </a:prstGeom>
+          <a:noFill/>
+          <a:extLst>
+            <a:ext uri="{909E8E84-426E-40DD-AFC4-6F175D3DCCD1}">
+              <a14:hiddenFill xmlns:a14="http://schemas.microsoft.com/office/drawing/2010/main">
+                <a:solidFill>
+                  <a:srgbClr val="FFFFFF"/>
+                </a:solidFill>
+              </a14:hiddenFill>
+            </a:ext>
+          </a:extLst>
+        </p:spPr>
+      </p:pic>
+    </p:spTree>
+    <p:extLst>
+      <p:ext uri="{BB962C8B-B14F-4D97-AF65-F5344CB8AC3E}">
+        <p14:creationId xmlns:p14="http://schemas.microsoft.com/office/powerpoint/2010/main" val="3820507382"/>
+      </p:ext>
+    </p:extLst>
+  </p:cSld>
+  <p:clrMapOvr>
+    <a:masterClrMapping/>
+  </p:clrMapOvr>
+</p:sld>
+</file>
+
+<file path=ppt/slides/slide21.xml><?xml version="1.0" encoding="utf-8"?>
+<p:sld xmlns:a="http://schemas.openxmlformats.org/drawingml/2006/main" xmlns:r="http://schemas.openxmlformats.org/officeDocument/2006/relationships" xmlns:p="http://schemas.openxmlformats.org/presentationml/2006/main">
+  <p:cSld>
+    <p:spTree>
+      <p:nvGrpSpPr>
+        <p:cNvPr id="1" name=""/>
+        <p:cNvGrpSpPr/>
+        <p:nvPr/>
+      </p:nvGrpSpPr>
+      <p:grpSpPr>
+        <a:xfrm>
+          <a:off x="0" y="0"/>
+          <a:ext cx="0" cy="0"/>
+          <a:chOff x="0" y="0"/>
+          <a:chExt cx="0" cy="0"/>
+        </a:xfrm>
+      </p:grpSpPr>
+      <p:sp>
+        <p:nvSpPr>
+          <p:cNvPr id="2" name="Title 1"/>
+          <p:cNvSpPr>
+            <a:spLocks noGrp="1"/>
+          </p:cNvSpPr>
+          <p:nvPr>
+            <p:ph type="title"/>
+          </p:nvPr>
+        </p:nvSpPr>
+        <p:spPr/>
+        <p:txBody>
+          <a:bodyPr/>
+          <a:lstStyle/>
+          <a:p>
+            <a:r>
+              <a:rPr lang="bg-BG" dirty="0" smtClean="0"/>
+              <a:t>Въпроси</a:t>
+            </a:r>
+            <a:endParaRPr lang="en-US" dirty="0"/>
+          </a:p>
+        </p:txBody>
+      </p:sp>
+      <p:pic>
+        <p:nvPicPr>
+          <p:cNvPr id="10242" name="Picture 2" descr="http://espei.com/wp-content/uploads/2013/05/equipmentprotection3.png"/>
+          <p:cNvPicPr>
+            <a:picLocks noChangeAspect="1" noChangeArrowheads="1"/>
+          </p:cNvPicPr>
+          <p:nvPr/>
+        </p:nvPicPr>
+        <p:blipFill>
+          <a:blip r:embed="rId2">
+            <a:extLst>
+              <a:ext uri="{28A0092B-C50C-407E-A947-70E740481C1C}">
+                <a14:useLocalDpi xmlns:a14="http://schemas.microsoft.com/office/drawing/2010/main" val="0"/>
+              </a:ext>
+            </a:extLst>
+          </a:blip>
+          <a:srcRect/>
+          <a:stretch>
+            <a:fillRect/>
+          </a:stretch>
+        </p:blipFill>
+        <p:spPr bwMode="auto">
+          <a:xfrm>
+            <a:off x="3691504" y="2214694"/>
+            <a:ext cx="4808992" cy="4808992"/>
+          </a:xfrm>
+          <a:prstGeom prst="rect">
+            <a:avLst/>
+          </a:prstGeom>
+          <a:noFill/>
+          <a:extLst>
+            <a:ext uri="{909E8E84-426E-40DD-AFC4-6F175D3DCCD1}">
+              <a14:hiddenFill xmlns:a14="http://schemas.microsoft.com/office/drawing/2010/main">
+                <a:solidFill>
+                  <a:srgbClr val="FFFFFF"/>
+                </a:solidFill>
+              </a14:hiddenFill>
+            </a:ext>
+          </a:extLst>
+        </p:spPr>
+      </p:pic>
+    </p:spTree>
+    <p:extLst>
+      <p:ext uri="{BB962C8B-B14F-4D97-AF65-F5344CB8AC3E}">
+        <p14:creationId xmlns:p14="http://schemas.microsoft.com/office/powerpoint/2010/main" val="4278737868"/>
       </p:ext>
     </p:extLst>
   </p:cSld>
@@ -6648,33 +8117,792 @@
           <a:bodyPr/>
           <a:lstStyle/>
           <a:p>
-            <a:endParaRPr lang="en-US"/>
-          </a:p>
-        </p:txBody>
-      </p:sp>
-      <p:sp>
-        <p:nvSpPr>
-          <p:cNvPr id="3" name="Content Placeholder 2"/>
-          <p:cNvSpPr>
-            <a:spLocks noGrp="1"/>
-          </p:cNvSpPr>
-          <p:nvPr>
-            <p:ph sz="quarter" idx="13"/>
-          </p:nvPr>
-        </p:nvSpPr>
-        <p:spPr/>
-        <p:txBody>
-          <a:bodyPr/>
-          <a:lstStyle/>
-          <a:p>
-            <a:endParaRPr lang="en-US"/>
-          </a:p>
-        </p:txBody>
-      </p:sp>
+            <a:r>
+              <a:rPr lang="en-US" dirty="0" err="1"/>
+              <a:t>Mysql</a:t>
+            </a:r>
+            <a:r>
+              <a:rPr lang="en-US" dirty="0"/>
+              <a:t> </a:t>
+            </a:r>
+            <a:r>
+              <a:rPr lang="en-US" dirty="0" smtClean="0"/>
+              <a:t>workbench</a:t>
+            </a:r>
+            <a:r>
+              <a:rPr lang="bg-BG" dirty="0" smtClean="0"/>
+              <a:t> </a:t>
+            </a:r>
+            <a:r>
+              <a:rPr lang="bg-BG" dirty="0" err="1" smtClean="0"/>
+              <a:t>ДЕмо</a:t>
+            </a:r>
+            <a:endParaRPr lang="en-US" dirty="0"/>
+          </a:p>
+        </p:txBody>
+      </p:sp>
+      <p:pic>
+        <p:nvPicPr>
+          <p:cNvPr id="1026" name="Picture 2" descr="http://www.orcsweb.com/wp-content/uploads/2013/05/mysqlWorkbench.png"/>
+          <p:cNvPicPr>
+            <a:picLocks noChangeAspect="1" noChangeArrowheads="1"/>
+          </p:cNvPicPr>
+          <p:nvPr/>
+        </p:nvPicPr>
+        <p:blipFill>
+          <a:blip r:embed="rId2">
+            <a:extLst>
+              <a:ext uri="{28A0092B-C50C-407E-A947-70E740481C1C}">
+                <a14:useLocalDpi xmlns:a14="http://schemas.microsoft.com/office/drawing/2010/main" val="0"/>
+              </a:ext>
+            </a:extLst>
+          </a:blip>
+          <a:srcRect/>
+          <a:stretch>
+            <a:fillRect/>
+          </a:stretch>
+        </p:blipFill>
+        <p:spPr bwMode="auto">
+          <a:xfrm>
+            <a:off x="4462553" y="2214694"/>
+            <a:ext cx="3266893" cy="3266893"/>
+          </a:xfrm>
+          <a:prstGeom prst="rect">
+            <a:avLst/>
+          </a:prstGeom>
+          <a:noFill/>
+          <a:extLst>
+            <a:ext uri="{909E8E84-426E-40DD-AFC4-6F175D3DCCD1}">
+              <a14:hiddenFill xmlns:a14="http://schemas.microsoft.com/office/drawing/2010/main">
+                <a:solidFill>
+                  <a:srgbClr val="FFFFFF"/>
+                </a:solidFill>
+              </a14:hiddenFill>
+            </a:ext>
+          </a:extLst>
+        </p:spPr>
+      </p:pic>
     </p:spTree>
     <p:extLst>
       <p:ext uri="{BB962C8B-B14F-4D97-AF65-F5344CB8AC3E}">
         <p14:creationId xmlns:p14="http://schemas.microsoft.com/office/powerpoint/2010/main" val="3550516719"/>
+      </p:ext>
+    </p:extLst>
+  </p:cSld>
+  <p:clrMapOvr>
+    <a:masterClrMapping/>
+  </p:clrMapOvr>
+</p:sld>
+</file>
+
+<file path=ppt/slides/slide4.xml><?xml version="1.0" encoding="utf-8"?>
+<p:sld xmlns:a="http://schemas.openxmlformats.org/drawingml/2006/main" xmlns:r="http://schemas.openxmlformats.org/officeDocument/2006/relationships" xmlns:p="http://schemas.openxmlformats.org/presentationml/2006/main">
+  <p:cSld>
+    <p:spTree>
+      <p:nvGrpSpPr>
+        <p:cNvPr id="1" name=""/>
+        <p:cNvGrpSpPr/>
+        <p:nvPr/>
+      </p:nvGrpSpPr>
+      <p:grpSpPr>
+        <a:xfrm>
+          <a:off x="0" y="0"/>
+          <a:ext cx="0" cy="0"/>
+          <a:chOff x="0" y="0"/>
+          <a:chExt cx="0" cy="0"/>
+        </a:xfrm>
+      </p:grpSpPr>
+      <p:sp>
+        <p:nvSpPr>
+          <p:cNvPr id="2" name="Title 1"/>
+          <p:cNvSpPr>
+            <a:spLocks noGrp="1"/>
+          </p:cNvSpPr>
+          <p:nvPr>
+            <p:ph type="title"/>
+          </p:nvPr>
+        </p:nvSpPr>
+        <p:spPr/>
+        <p:txBody>
+          <a:bodyPr/>
+          <a:lstStyle/>
+          <a:p>
+            <a:r>
+              <a:rPr lang="bg-BG" dirty="0" smtClean="0"/>
+              <a:t>Видове връзки между таблиците в </a:t>
+            </a:r>
+            <a:r>
+              <a:rPr lang="en-US" dirty="0" err="1" smtClean="0"/>
+              <a:t>mysql</a:t>
+            </a:r>
+            <a:endParaRPr lang="en-US" dirty="0"/>
+          </a:p>
+        </p:txBody>
+      </p:sp>
+      <p:sp>
+        <p:nvSpPr>
+          <p:cNvPr id="3" name="Content Placeholder 2"/>
+          <p:cNvSpPr>
+            <a:spLocks noGrp="1"/>
+          </p:cNvSpPr>
+          <p:nvPr>
+            <p:ph sz="quarter" idx="13"/>
+          </p:nvPr>
+        </p:nvSpPr>
+        <p:spPr/>
+        <p:txBody>
+          <a:bodyPr/>
+          <a:lstStyle/>
+          <a:p>
+            <a:r>
+              <a:rPr lang="bg-BG" dirty="0" smtClean="0"/>
+              <a:t>Информацията представена в табличен вид трябва да бъде свързана</a:t>
+            </a:r>
+          </a:p>
+          <a:p>
+            <a:r>
+              <a:rPr lang="bg-BG" dirty="0" smtClean="0"/>
+              <a:t>Съществуват 3 основни връзки между таблиците:</a:t>
+            </a:r>
+          </a:p>
+          <a:p>
+            <a:pPr marL="457200" indent="-457200">
+              <a:buAutoNum type="arabicParenR"/>
+            </a:pPr>
+            <a:r>
+              <a:rPr lang="bg-BG" dirty="0" smtClean="0"/>
+              <a:t>1 -&gt; </a:t>
+            </a:r>
+            <a:r>
+              <a:rPr lang="en-US" dirty="0" smtClean="0"/>
+              <a:t>n : </a:t>
+            </a:r>
+            <a:r>
+              <a:rPr lang="bg-BG" dirty="0" smtClean="0"/>
+              <a:t>едно към много</a:t>
+            </a:r>
+          </a:p>
+          <a:p>
+            <a:pPr marL="457200" indent="-457200">
+              <a:buAutoNum type="arabicParenR"/>
+            </a:pPr>
+            <a:r>
+              <a:rPr lang="bg-BG" dirty="0" smtClean="0"/>
+              <a:t>1 -&gt; 1 : едно към едно</a:t>
+            </a:r>
+          </a:p>
+          <a:p>
+            <a:pPr marL="457200" indent="-457200">
+              <a:buAutoNum type="arabicParenR"/>
+            </a:pPr>
+            <a:r>
+              <a:rPr lang="en-US" dirty="0" smtClean="0"/>
+              <a:t>N -&gt; m: </a:t>
+            </a:r>
+            <a:r>
+              <a:rPr lang="bg-BG" dirty="0" smtClean="0"/>
+              <a:t>много към много</a:t>
+            </a:r>
+            <a:endParaRPr lang="en-US" dirty="0"/>
+          </a:p>
+        </p:txBody>
+      </p:sp>
+    </p:spTree>
+    <p:extLst>
+      <p:ext uri="{BB962C8B-B14F-4D97-AF65-F5344CB8AC3E}">
+        <p14:creationId xmlns:p14="http://schemas.microsoft.com/office/powerpoint/2010/main" val="2980853840"/>
+      </p:ext>
+    </p:extLst>
+  </p:cSld>
+  <p:clrMapOvr>
+    <a:masterClrMapping/>
+  </p:clrMapOvr>
+</p:sld>
+</file>
+
+<file path=ppt/slides/slide5.xml><?xml version="1.0" encoding="utf-8"?>
+<p:sld xmlns:a="http://schemas.openxmlformats.org/drawingml/2006/main" xmlns:r="http://schemas.openxmlformats.org/officeDocument/2006/relationships" xmlns:p="http://schemas.openxmlformats.org/presentationml/2006/main">
+  <p:cSld>
+    <p:spTree>
+      <p:nvGrpSpPr>
+        <p:cNvPr id="1" name=""/>
+        <p:cNvGrpSpPr/>
+        <p:nvPr/>
+      </p:nvGrpSpPr>
+      <p:grpSpPr>
+        <a:xfrm>
+          <a:off x="0" y="0"/>
+          <a:ext cx="0" cy="0"/>
+          <a:chOff x="0" y="0"/>
+          <a:chExt cx="0" cy="0"/>
+        </a:xfrm>
+      </p:grpSpPr>
+      <p:sp>
+        <p:nvSpPr>
+          <p:cNvPr id="2" name="Title 1"/>
+          <p:cNvSpPr>
+            <a:spLocks noGrp="1"/>
+          </p:cNvSpPr>
+          <p:nvPr>
+            <p:ph type="title"/>
+          </p:nvPr>
+        </p:nvSpPr>
+        <p:spPr/>
+        <p:txBody>
+          <a:bodyPr/>
+          <a:lstStyle/>
+          <a:p>
+            <a:r>
+              <a:rPr lang="bg-BG" dirty="0"/>
+              <a:t>Видове връзки между таблиците в </a:t>
+            </a:r>
+            <a:r>
+              <a:rPr lang="en-US" dirty="0" err="1"/>
+              <a:t>mysql</a:t>
+            </a:r>
+            <a:endParaRPr lang="en-US" dirty="0"/>
+          </a:p>
+        </p:txBody>
+      </p:sp>
+      <p:pic>
+        <p:nvPicPr>
+          <p:cNvPr id="2050" name="Picture 2" descr="http://blog.woodylabs.com/wp-content/uploads/2010/12/sql-full-to-sql-compact.png"/>
+          <p:cNvPicPr>
+            <a:picLocks noChangeAspect="1" noChangeArrowheads="1"/>
+          </p:cNvPicPr>
+          <p:nvPr/>
+        </p:nvPicPr>
+        <p:blipFill>
+          <a:blip r:embed="rId2">
+            <a:extLst>
+              <a:ext uri="{28A0092B-C50C-407E-A947-70E740481C1C}">
+                <a14:useLocalDpi xmlns:a14="http://schemas.microsoft.com/office/drawing/2010/main" val="0"/>
+              </a:ext>
+            </a:extLst>
+          </a:blip>
+          <a:srcRect/>
+          <a:stretch>
+            <a:fillRect/>
+          </a:stretch>
+        </p:blipFill>
+        <p:spPr bwMode="auto">
+          <a:xfrm>
+            <a:off x="4061959" y="2214694"/>
+            <a:ext cx="4068082" cy="4068082"/>
+          </a:xfrm>
+          <a:prstGeom prst="rect">
+            <a:avLst/>
+          </a:prstGeom>
+          <a:noFill/>
+          <a:extLst>
+            <a:ext uri="{909E8E84-426E-40DD-AFC4-6F175D3DCCD1}">
+              <a14:hiddenFill xmlns:a14="http://schemas.microsoft.com/office/drawing/2010/main">
+                <a:solidFill>
+                  <a:srgbClr val="FFFFFF"/>
+                </a:solidFill>
+              </a14:hiddenFill>
+            </a:ext>
+          </a:extLst>
+        </p:spPr>
+      </p:pic>
+    </p:spTree>
+    <p:extLst>
+      <p:ext uri="{BB962C8B-B14F-4D97-AF65-F5344CB8AC3E}">
+        <p14:creationId xmlns:p14="http://schemas.microsoft.com/office/powerpoint/2010/main" val="1392971389"/>
+      </p:ext>
+    </p:extLst>
+  </p:cSld>
+  <p:clrMapOvr>
+    <a:masterClrMapping/>
+  </p:clrMapOvr>
+</p:sld>
+</file>
+
+<file path=ppt/slides/slide6.xml><?xml version="1.0" encoding="utf-8"?>
+<p:sld xmlns:a="http://schemas.openxmlformats.org/drawingml/2006/main" xmlns:r="http://schemas.openxmlformats.org/officeDocument/2006/relationships" xmlns:p="http://schemas.openxmlformats.org/presentationml/2006/main">
+  <p:cSld>
+    <p:spTree>
+      <p:nvGrpSpPr>
+        <p:cNvPr id="1" name=""/>
+        <p:cNvGrpSpPr/>
+        <p:nvPr/>
+      </p:nvGrpSpPr>
+      <p:grpSpPr>
+        <a:xfrm>
+          <a:off x="0" y="0"/>
+          <a:ext cx="0" cy="0"/>
+          <a:chOff x="0" y="0"/>
+          <a:chExt cx="0" cy="0"/>
+        </a:xfrm>
+      </p:grpSpPr>
+      <p:sp>
+        <p:nvSpPr>
+          <p:cNvPr id="2" name="Title 1"/>
+          <p:cNvSpPr>
+            <a:spLocks noGrp="1"/>
+          </p:cNvSpPr>
+          <p:nvPr>
+            <p:ph type="title"/>
+          </p:nvPr>
+        </p:nvSpPr>
+        <p:spPr/>
+        <p:txBody>
+          <a:bodyPr/>
+          <a:lstStyle/>
+          <a:p>
+            <a:r>
+              <a:rPr lang="bg-BG" dirty="0" smtClean="0"/>
+              <a:t>Индекси в </a:t>
+            </a:r>
+            <a:r>
+              <a:rPr lang="en-US" dirty="0" err="1" smtClean="0"/>
+              <a:t>mysql</a:t>
+            </a:r>
+            <a:endParaRPr lang="en-US" dirty="0"/>
+          </a:p>
+        </p:txBody>
+      </p:sp>
+      <p:sp>
+        <p:nvSpPr>
+          <p:cNvPr id="3" name="Content Placeholder 2"/>
+          <p:cNvSpPr>
+            <a:spLocks noGrp="1"/>
+          </p:cNvSpPr>
+          <p:nvPr>
+            <p:ph sz="quarter" idx="13"/>
+          </p:nvPr>
+        </p:nvSpPr>
+        <p:spPr/>
+        <p:txBody>
+          <a:bodyPr>
+            <a:normAutofit/>
+          </a:bodyPr>
+          <a:lstStyle/>
+          <a:p>
+            <a:r>
+              <a:rPr lang="bg-BG" dirty="0" smtClean="0"/>
+              <a:t>Индексите се прилагат на определена колона</a:t>
+            </a:r>
+          </a:p>
+          <a:p>
+            <a:r>
+              <a:rPr lang="en-US" dirty="0" smtClean="0"/>
+              <a:t>Primary key index – </a:t>
+            </a:r>
+            <a:r>
+              <a:rPr lang="bg-BG" dirty="0" smtClean="0"/>
+              <a:t>идентификация на всеки запис</a:t>
+            </a:r>
+            <a:endParaRPr lang="en-US" dirty="0" smtClean="0"/>
+          </a:p>
+          <a:p>
+            <a:r>
+              <a:rPr lang="en-US" dirty="0" smtClean="0"/>
+              <a:t>Foreign key index</a:t>
+            </a:r>
+            <a:r>
+              <a:rPr lang="bg-BG" dirty="0" smtClean="0"/>
+              <a:t> – определя връзка с друга таблица</a:t>
+            </a:r>
+            <a:endParaRPr lang="en-US" dirty="0" smtClean="0"/>
+          </a:p>
+          <a:p>
+            <a:r>
+              <a:rPr lang="en-US" dirty="0" smtClean="0"/>
+              <a:t>Non unique index</a:t>
+            </a:r>
+            <a:r>
+              <a:rPr lang="bg-BG" dirty="0" smtClean="0"/>
+              <a:t> – оптимизира процес на търсене по таблицата</a:t>
+            </a:r>
+            <a:endParaRPr lang="en-US" dirty="0" smtClean="0"/>
+          </a:p>
+          <a:p>
+            <a:r>
+              <a:rPr lang="en-US" dirty="0" smtClean="0"/>
+              <a:t>Unique index</a:t>
+            </a:r>
+            <a:r>
+              <a:rPr lang="bg-BG" dirty="0" smtClean="0"/>
+              <a:t> – индексирана колона трябва да съдържа уникална стойност за всеки запис</a:t>
+            </a:r>
+            <a:endParaRPr lang="en-US" dirty="0"/>
+          </a:p>
+        </p:txBody>
+      </p:sp>
+    </p:spTree>
+    <p:extLst>
+      <p:ext uri="{BB962C8B-B14F-4D97-AF65-F5344CB8AC3E}">
+        <p14:creationId xmlns:p14="http://schemas.microsoft.com/office/powerpoint/2010/main" val="1989649509"/>
+      </p:ext>
+    </p:extLst>
+  </p:cSld>
+  <p:clrMapOvr>
+    <a:masterClrMapping/>
+  </p:clrMapOvr>
+</p:sld>
+</file>
+
+<file path=ppt/slides/slide7.xml><?xml version="1.0" encoding="utf-8"?>
+<p:sld xmlns:a="http://schemas.openxmlformats.org/drawingml/2006/main" xmlns:r="http://schemas.openxmlformats.org/officeDocument/2006/relationships" xmlns:p="http://schemas.openxmlformats.org/presentationml/2006/main">
+  <p:cSld>
+    <p:spTree>
+      <p:nvGrpSpPr>
+        <p:cNvPr id="1" name=""/>
+        <p:cNvGrpSpPr/>
+        <p:nvPr/>
+      </p:nvGrpSpPr>
+      <p:grpSpPr>
+        <a:xfrm>
+          <a:off x="0" y="0"/>
+          <a:ext cx="0" cy="0"/>
+          <a:chOff x="0" y="0"/>
+          <a:chExt cx="0" cy="0"/>
+        </a:xfrm>
+      </p:grpSpPr>
+      <p:sp>
+        <p:nvSpPr>
+          <p:cNvPr id="2" name="Title 1"/>
+          <p:cNvSpPr>
+            <a:spLocks noGrp="1"/>
+          </p:cNvSpPr>
+          <p:nvPr>
+            <p:ph type="title"/>
+          </p:nvPr>
+        </p:nvSpPr>
+        <p:spPr/>
+        <p:txBody>
+          <a:bodyPr/>
+          <a:lstStyle/>
+          <a:p>
+            <a:r>
+              <a:rPr lang="bg-BG" dirty="0"/>
+              <a:t>Индекси в </a:t>
+            </a:r>
+            <a:r>
+              <a:rPr lang="en-US" dirty="0" err="1" smtClean="0"/>
+              <a:t>mysql</a:t>
+            </a:r>
+            <a:r>
+              <a:rPr lang="en-US" dirty="0" smtClean="0"/>
+              <a:t> </a:t>
+            </a:r>
+            <a:r>
+              <a:rPr lang="bg-BG" dirty="0" smtClean="0"/>
+              <a:t>демо</a:t>
+            </a:r>
+            <a:endParaRPr lang="en-US" dirty="0"/>
+          </a:p>
+        </p:txBody>
+      </p:sp>
+      <p:pic>
+        <p:nvPicPr>
+          <p:cNvPr id="3074" name="Picture 2" descr="http://www.finalconcept.com.au/uploads/keyvisuals/sql_server_management_studio.png"/>
+          <p:cNvPicPr>
+            <a:picLocks noChangeAspect="1" noChangeArrowheads="1"/>
+          </p:cNvPicPr>
+          <p:nvPr/>
+        </p:nvPicPr>
+        <p:blipFill>
+          <a:blip r:embed="rId2">
+            <a:extLst>
+              <a:ext uri="{28A0092B-C50C-407E-A947-70E740481C1C}">
+                <a14:useLocalDpi xmlns:a14="http://schemas.microsoft.com/office/drawing/2010/main" val="0"/>
+              </a:ext>
+            </a:extLst>
+          </a:blip>
+          <a:srcRect/>
+          <a:stretch>
+            <a:fillRect/>
+          </a:stretch>
+        </p:blipFill>
+        <p:spPr bwMode="auto">
+          <a:xfrm>
+            <a:off x="3988525" y="2214694"/>
+            <a:ext cx="4214949" cy="4214949"/>
+          </a:xfrm>
+          <a:prstGeom prst="rect">
+            <a:avLst/>
+          </a:prstGeom>
+          <a:noFill/>
+          <a:extLst>
+            <a:ext uri="{909E8E84-426E-40DD-AFC4-6F175D3DCCD1}">
+              <a14:hiddenFill xmlns:a14="http://schemas.microsoft.com/office/drawing/2010/main">
+                <a:solidFill>
+                  <a:srgbClr val="FFFFFF"/>
+                </a:solidFill>
+              </a14:hiddenFill>
+            </a:ext>
+          </a:extLst>
+        </p:spPr>
+      </p:pic>
+    </p:spTree>
+    <p:extLst>
+      <p:ext uri="{BB962C8B-B14F-4D97-AF65-F5344CB8AC3E}">
+        <p14:creationId xmlns:p14="http://schemas.microsoft.com/office/powerpoint/2010/main" val="3827535732"/>
+      </p:ext>
+    </p:extLst>
+  </p:cSld>
+  <p:clrMapOvr>
+    <a:masterClrMapping/>
+  </p:clrMapOvr>
+</p:sld>
+</file>
+
+<file path=ppt/slides/slide8.xml><?xml version="1.0" encoding="utf-8"?>
+<p:sld xmlns:a="http://schemas.openxmlformats.org/drawingml/2006/main" xmlns:r="http://schemas.openxmlformats.org/officeDocument/2006/relationships" xmlns:p="http://schemas.openxmlformats.org/presentationml/2006/main">
+  <p:cSld>
+    <p:spTree>
+      <p:nvGrpSpPr>
+        <p:cNvPr id="1" name=""/>
+        <p:cNvGrpSpPr/>
+        <p:nvPr/>
+      </p:nvGrpSpPr>
+      <p:grpSpPr>
+        <a:xfrm>
+          <a:off x="0" y="0"/>
+          <a:ext cx="0" cy="0"/>
+          <a:chOff x="0" y="0"/>
+          <a:chExt cx="0" cy="0"/>
+        </a:xfrm>
+      </p:grpSpPr>
+      <p:sp>
+        <p:nvSpPr>
+          <p:cNvPr id="2" name="Title 1"/>
+          <p:cNvSpPr>
+            <a:spLocks noGrp="1"/>
+          </p:cNvSpPr>
+          <p:nvPr>
+            <p:ph type="title"/>
+          </p:nvPr>
+        </p:nvSpPr>
+        <p:spPr/>
+        <p:txBody>
+          <a:bodyPr/>
+          <a:lstStyle/>
+          <a:p>
+            <a:r>
+              <a:rPr lang="bg-BG" dirty="0" err="1" smtClean="0"/>
+              <a:t>ЗАдача</a:t>
+            </a:r>
+            <a:endParaRPr lang="en-US" dirty="0"/>
+          </a:p>
+        </p:txBody>
+      </p:sp>
+      <p:sp>
+        <p:nvSpPr>
+          <p:cNvPr id="3" name="Content Placeholder 2"/>
+          <p:cNvSpPr>
+            <a:spLocks noGrp="1"/>
+          </p:cNvSpPr>
+          <p:nvPr>
+            <p:ph sz="quarter" idx="13"/>
+          </p:nvPr>
+        </p:nvSpPr>
+        <p:spPr>
+          <a:xfrm>
+            <a:off x="913774" y="1985554"/>
+            <a:ext cx="10363826" cy="4872446"/>
+          </a:xfrm>
+        </p:spPr>
+        <p:txBody>
+          <a:bodyPr>
+            <a:normAutofit lnSpcReduction="10000"/>
+          </a:bodyPr>
+          <a:lstStyle/>
+          <a:p>
+            <a:r>
+              <a:rPr lang="bg-BG" dirty="0" smtClean="0"/>
+              <a:t>Създайте база данни за училище съдържаща следните таблици:</a:t>
+            </a:r>
+          </a:p>
+          <a:p>
+            <a:pPr marL="457200" indent="-457200">
+              <a:buAutoNum type="arabicParenR"/>
+            </a:pPr>
+            <a:r>
+              <a:rPr lang="bg-BG" dirty="0" smtClean="0"/>
+              <a:t>Предмети</a:t>
+            </a:r>
+          </a:p>
+          <a:p>
+            <a:pPr marL="457200" indent="-457200">
+              <a:buAutoNum type="arabicParenR"/>
+            </a:pPr>
+            <a:r>
+              <a:rPr lang="bg-BG" dirty="0" smtClean="0"/>
+              <a:t>Преподаватели</a:t>
+            </a:r>
+          </a:p>
+          <a:p>
+            <a:pPr marL="457200" indent="-457200">
+              <a:buAutoNum type="arabicParenR"/>
+            </a:pPr>
+            <a:r>
+              <a:rPr lang="bg-BG" dirty="0" smtClean="0"/>
+              <a:t>Ученици</a:t>
+            </a:r>
+          </a:p>
+          <a:p>
+            <a:pPr marL="457200" indent="-457200">
+              <a:buAutoNum type="arabicParenR"/>
+            </a:pPr>
+            <a:r>
+              <a:rPr lang="bg-BG" dirty="0" smtClean="0"/>
+              <a:t>Класове</a:t>
+            </a:r>
+          </a:p>
+          <a:p>
+            <a:pPr marL="0" indent="0">
+              <a:buNone/>
+            </a:pPr>
+            <a:r>
+              <a:rPr lang="bg-BG" dirty="0" smtClean="0"/>
+              <a:t>Създайте нужните според вас колони</a:t>
+            </a:r>
+          </a:p>
+          <a:p>
+            <a:pPr marL="0" indent="0">
+              <a:buNone/>
+            </a:pPr>
+            <a:r>
+              <a:rPr lang="bg-BG" dirty="0" smtClean="0"/>
+              <a:t>Приложете следните връзки между отделните таблици</a:t>
+            </a:r>
+          </a:p>
+          <a:p>
+            <a:pPr marL="457200" indent="-457200">
+              <a:buAutoNum type="arabicParenR"/>
+            </a:pPr>
+            <a:r>
+              <a:rPr lang="bg-BG" dirty="0" smtClean="0"/>
+              <a:t>Предмети – преподаватели: 1-&gt;1</a:t>
+            </a:r>
+          </a:p>
+          <a:p>
+            <a:pPr marL="457200" indent="-457200">
+              <a:buAutoNum type="arabicParenR"/>
+            </a:pPr>
+            <a:r>
+              <a:rPr lang="bg-BG" dirty="0" smtClean="0"/>
+              <a:t>Ученици – класове: 1 -&gt; </a:t>
+            </a:r>
+            <a:r>
+              <a:rPr lang="en-US" dirty="0" smtClean="0"/>
+              <a:t>n</a:t>
+            </a:r>
+          </a:p>
+          <a:p>
+            <a:pPr marL="457200" indent="-457200">
+              <a:buAutoNum type="arabicParenR"/>
+            </a:pPr>
+            <a:r>
+              <a:rPr lang="bg-BG" dirty="0" smtClean="0"/>
+              <a:t>Ученици – предмети: </a:t>
+            </a:r>
+            <a:r>
+              <a:rPr lang="en-US" dirty="0" smtClean="0"/>
+              <a:t>m:n</a:t>
+            </a:r>
+            <a:r>
+              <a:rPr lang="bg-BG" dirty="0" smtClean="0"/>
+              <a:t> </a:t>
+            </a:r>
+            <a:endParaRPr lang="en-US" dirty="0"/>
+          </a:p>
+        </p:txBody>
+      </p:sp>
+    </p:spTree>
+    <p:extLst>
+      <p:ext uri="{BB962C8B-B14F-4D97-AF65-F5344CB8AC3E}">
+        <p14:creationId xmlns:p14="http://schemas.microsoft.com/office/powerpoint/2010/main" val="731743248"/>
+      </p:ext>
+    </p:extLst>
+  </p:cSld>
+  <p:clrMapOvr>
+    <a:masterClrMapping/>
+  </p:clrMapOvr>
+</p:sld>
+</file>
+
+<file path=ppt/slides/slide9.xml><?xml version="1.0" encoding="utf-8"?>
+<p:sld xmlns:a="http://schemas.openxmlformats.org/drawingml/2006/main" xmlns:r="http://schemas.openxmlformats.org/officeDocument/2006/relationships" xmlns:p="http://schemas.openxmlformats.org/presentationml/2006/main">
+  <p:cSld>
+    <p:spTree>
+      <p:nvGrpSpPr>
+        <p:cNvPr id="1" name=""/>
+        <p:cNvGrpSpPr/>
+        <p:nvPr/>
+      </p:nvGrpSpPr>
+      <p:grpSpPr>
+        <a:xfrm>
+          <a:off x="0" y="0"/>
+          <a:ext cx="0" cy="0"/>
+          <a:chOff x="0" y="0"/>
+          <a:chExt cx="0" cy="0"/>
+        </a:xfrm>
+      </p:grpSpPr>
+      <p:sp>
+        <p:nvSpPr>
+          <p:cNvPr id="2" name="Title 1"/>
+          <p:cNvSpPr>
+            <a:spLocks noGrp="1"/>
+          </p:cNvSpPr>
+          <p:nvPr>
+            <p:ph type="title"/>
+          </p:nvPr>
+        </p:nvSpPr>
+        <p:spPr/>
+        <p:txBody>
+          <a:bodyPr/>
+          <a:lstStyle/>
+          <a:p>
+            <a:r>
+              <a:rPr lang="bg-BG" dirty="0" smtClean="0"/>
+              <a:t>Псевдоними на таблици и колони</a:t>
+            </a:r>
+            <a:endParaRPr lang="en-US" dirty="0"/>
+          </a:p>
+        </p:txBody>
+      </p:sp>
+      <p:sp>
+        <p:nvSpPr>
+          <p:cNvPr id="3" name="Content Placeholder 2"/>
+          <p:cNvSpPr>
+            <a:spLocks noGrp="1"/>
+          </p:cNvSpPr>
+          <p:nvPr>
+            <p:ph sz="quarter" idx="13"/>
+          </p:nvPr>
+        </p:nvSpPr>
+        <p:spPr/>
+        <p:txBody>
+          <a:bodyPr/>
+          <a:lstStyle/>
+          <a:p>
+            <a:r>
+              <a:rPr lang="bg-BG" dirty="0" smtClean="0"/>
+              <a:t>В една заявка могат да бъдат залагани псевдоними на таблици</a:t>
+            </a:r>
+          </a:p>
+          <a:p>
+            <a:r>
+              <a:rPr lang="bg-BG" dirty="0" smtClean="0"/>
+              <a:t>Също така могат да се използват и псевдоними за колони</a:t>
+            </a:r>
+          </a:p>
+          <a:p>
+            <a:r>
+              <a:rPr lang="bg-BG" dirty="0" smtClean="0"/>
+              <a:t>Псевдонимите обичайно се използват като в една заявка използваме 2 или повече таблици</a:t>
+            </a:r>
+          </a:p>
+        </p:txBody>
+      </p:sp>
+    </p:spTree>
+    <p:extLst>
+      <p:ext uri="{BB962C8B-B14F-4D97-AF65-F5344CB8AC3E}">
+        <p14:creationId xmlns:p14="http://schemas.microsoft.com/office/powerpoint/2010/main" val="3446076352"/>
       </p:ext>
     </p:extLst>
   </p:cSld>

</xml_diff>

<commit_message>
Added more examples to mysql advanced
</commit_message>
<xml_diff>
--- a/10.advanced-mysql.pptx
+++ b/10.advanced-mysql.pptx
@@ -5,7 +5,7 @@
     <p:sldMasterId id="2147483660" r:id="rId1"/>
   </p:sldMasterIdLst>
   <p:notesMasterIdLst>
-    <p:notesMasterId r:id="rId23"/>
+    <p:notesMasterId r:id="rId25"/>
   </p:notesMasterIdLst>
   <p:sldIdLst>
     <p:sldId id="256" r:id="rId2"/>
@@ -26,9 +26,11 @@
     <p:sldId id="272" r:id="rId17"/>
     <p:sldId id="271" r:id="rId18"/>
     <p:sldId id="273" r:id="rId19"/>
-    <p:sldId id="274" r:id="rId20"/>
-    <p:sldId id="275" r:id="rId21"/>
-    <p:sldId id="276" r:id="rId22"/>
+    <p:sldId id="277" r:id="rId20"/>
+    <p:sldId id="278" r:id="rId21"/>
+    <p:sldId id="274" r:id="rId22"/>
+    <p:sldId id="275" r:id="rId23"/>
+    <p:sldId id="276" r:id="rId24"/>
   </p:sldIdLst>
   <p:sldSz cx="12192000" cy="6858000"/>
   <p:notesSz cx="6858000" cy="9144000"/>
@@ -7635,7 +7637,15 @@
           <a:p>
             <a:r>
               <a:rPr lang="bg-BG" dirty="0" smtClean="0"/>
-              <a:t>Агрегатни функции</a:t>
+              <a:t>Прилагане на </a:t>
+            </a:r>
+            <a:r>
+              <a:rPr lang="en-US" dirty="0" smtClean="0"/>
+              <a:t>Join </a:t>
+            </a:r>
+            <a:r>
+              <a:rPr lang="bg-BG" dirty="0" smtClean="0"/>
+              <a:t>Многократно</a:t>
             </a:r>
             <a:endParaRPr lang="en-US" dirty="0"/>
           </a:p>
@@ -7658,48 +7668,35 @@
           <a:p>
             <a:r>
               <a:rPr lang="bg-BG" dirty="0" smtClean="0"/>
-              <a:t>С помощта на агрегатните функции можем да изчисляваме различни статистики за множества от стойности</a:t>
-            </a:r>
-          </a:p>
-          <a:p>
+              <a:t>В една заявка можем да употребяваме няколко пъти </a:t>
+            </a:r>
             <a:r>
               <a:rPr lang="en-US" dirty="0" smtClean="0"/>
-              <a:t>Group by </a:t>
-            </a:r>
+              <a:t>Join</a:t>
+            </a:r>
+          </a:p>
+          <a:p>
             <a:r>
               <a:rPr lang="bg-BG" dirty="0" smtClean="0"/>
-              <a:t>помага за групиране на резултатите – така избираме колона на чиято база да стане изчислението на </a:t>
-            </a:r>
-            <a:r>
-              <a:rPr lang="bg-BG" dirty="0" err="1" smtClean="0"/>
-              <a:t>статис</a:t>
+              <a:t>Всеки </a:t>
             </a:r>
             <a:r>
               <a:rPr lang="en-US" dirty="0" smtClean="0"/>
-              <a:t>t</a:t>
-            </a:r>
-            <a:r>
-              <a:rPr lang="bg-BG" dirty="0" err="1" smtClean="0"/>
-              <a:t>иката</a:t>
-            </a:r>
-            <a:endParaRPr lang="bg-BG" dirty="0" smtClean="0"/>
-          </a:p>
-          <a:p>
+              <a:t>join </a:t>
+            </a:r>
             <a:r>
               <a:rPr lang="bg-BG" dirty="0" smtClean="0"/>
-              <a:t>Функции: </a:t>
+              <a:t>присъединява резултати от нова таблица</a:t>
+            </a:r>
+          </a:p>
+          <a:p>
+            <a:r>
+              <a:rPr lang="bg-BG" dirty="0" smtClean="0"/>
+              <a:t>Може да се използва комбинация от различни видове </a:t>
             </a:r>
             <a:r>
               <a:rPr lang="en-US" dirty="0" smtClean="0"/>
-              <a:t>sum, </a:t>
-            </a:r>
-            <a:r>
-              <a:rPr lang="en-US" dirty="0" err="1" smtClean="0"/>
-              <a:t>avg</a:t>
-            </a:r>
-            <a:r>
-              <a:rPr lang="en-US" dirty="0" smtClean="0"/>
-              <a:t>, count, min, max</a:t>
+              <a:t>join</a:t>
             </a:r>
             <a:endParaRPr lang="en-US" dirty="0"/>
           </a:p>
@@ -7708,7 +7705,7 @@
     </p:spTree>
     <p:extLst>
       <p:ext uri="{BB962C8B-B14F-4D97-AF65-F5344CB8AC3E}">
-        <p14:creationId xmlns:p14="http://schemas.microsoft.com/office/powerpoint/2010/main" val="3884012569"/>
+        <p14:creationId xmlns:p14="http://schemas.microsoft.com/office/powerpoint/2010/main" val="3117335396"/>
       </p:ext>
     </p:extLst>
   </p:cSld>
@@ -7783,11 +7780,7 @@
             </a:r>
             <a:r>
               <a:rPr lang="bg-BG" dirty="0" smtClean="0"/>
-              <a:t> е добър </a:t>
-            </a:r>
-            <a:r>
-              <a:rPr lang="bg-BG" dirty="0" smtClean="0"/>
-              <a:t>за изпробване на заявки но не е много удобен за моделиране на схеми на бази данни</a:t>
+              <a:t> е добър за изпробване на заявки но не е много удобен за моделиране на схеми на бази данни</a:t>
             </a:r>
           </a:p>
           <a:p>
@@ -7886,6 +7879,350 @@
 </file>
 
 <file path=ppt/slides/slide20.xml><?xml version="1.0" encoding="utf-8"?>
+<p:sld xmlns:a="http://schemas.openxmlformats.org/drawingml/2006/main" xmlns:r="http://schemas.openxmlformats.org/officeDocument/2006/relationships" xmlns:p="http://schemas.openxmlformats.org/presentationml/2006/main">
+  <p:cSld>
+    <p:spTree>
+      <p:nvGrpSpPr>
+        <p:cNvPr id="1" name=""/>
+        <p:cNvGrpSpPr/>
+        <p:nvPr/>
+      </p:nvGrpSpPr>
+      <p:grpSpPr>
+        <a:xfrm>
+          <a:off x="0" y="0"/>
+          <a:ext cx="0" cy="0"/>
+          <a:chOff x="0" y="0"/>
+          <a:chExt cx="0" cy="0"/>
+        </a:xfrm>
+      </p:grpSpPr>
+      <p:sp>
+        <p:nvSpPr>
+          <p:cNvPr id="2" name="Title 1"/>
+          <p:cNvSpPr>
+            <a:spLocks noGrp="1"/>
+          </p:cNvSpPr>
+          <p:nvPr>
+            <p:ph type="title"/>
+          </p:nvPr>
+        </p:nvSpPr>
+        <p:spPr/>
+        <p:txBody>
+          <a:bodyPr/>
+          <a:lstStyle/>
+          <a:p>
+            <a:r>
+              <a:rPr lang="bg-BG" dirty="0"/>
+              <a:t>Прилагане на </a:t>
+            </a:r>
+            <a:r>
+              <a:rPr lang="en-US" dirty="0"/>
+              <a:t>Join </a:t>
+            </a:r>
+            <a:r>
+              <a:rPr lang="bg-BG" dirty="0" smtClean="0"/>
+              <a:t>Многократно</a:t>
+            </a:r>
+            <a:r>
+              <a:rPr lang="en-US" dirty="0" smtClean="0"/>
+              <a:t> </a:t>
+            </a:r>
+            <a:r>
+              <a:rPr lang="bg-BG" dirty="0" smtClean="0"/>
+              <a:t>ДЕМО</a:t>
+            </a:r>
+            <a:endParaRPr lang="en-US" dirty="0"/>
+          </a:p>
+        </p:txBody>
+      </p:sp>
+      <p:sp>
+        <p:nvSpPr>
+          <p:cNvPr id="5" name="AutoShape 4" descr="data:image/png;base64,iVBORw0KGgoAAAANSUhEUgAAAN8AAADiCAMAAAD5w+JtAAAAyVBMVEX///8TTmHoeRLncgAARFkASFwAQVcAQlfncwDndQAARlvncAASTWEAPlQLS18AO1Lg5+nV3uH4+vvJ1Nj//vyfsrnq7/H99Oz++fPoeQDw9PW7yM1VeYYxYXE8aHfa4uWDnKX76t2ywceVqrJ5lJ5khJD42cP20rjriz3DztLvqXTqhCr87+QfV2n54tFbfYr0xqXzvpjtl1VujJfxs4Xuo2z0xqP31bvqhS1/maLun2Lsk0zytopJb345ZXXrijsAMkzrkU/xs31bGmXbAAAfeUlEQVR4nO09C1ujSrLG0CRAIC9JYl7GPNSoJGp0Rp2J7s7//1GXpquaBhq6iToz996pb/fbPUfELur97KOjf/AP/sE/+Af/4B/8g38gQuds5C+W22lQMZsMzEow3S4X/uis86cP9xHoDLv+yzhouqZhEOJ5lRg8jxDDMF03GL/43eH/PjSHbX83tV3DTqCVBc+zDdee7vz28E8fWR/O/G1ghqgVYpbAkhhmsPXbf/rgOtBdBrZB9HETcLSD5fpPH78Y1jvTJV6jNHIMGh4x3dXoTyORB+1ZxSUHohYDccmy+/cpnJ6/d+0cwoXK0jZqobZ0m+F/XTPUp7ZN8nmYuG+L3p9GKAFny4opO65nm27Te9u+LPz5un3W6vV6rfZ67vuL2XL75jXdmlwLeUZl9/dom+7YzpKuQYymvZ/N251cZusM2/PZ1GxKkSTG9O+QxPUkI3WhLjQqW7+l94LWfBcQM8uunhvMv/boGrCeusmDNTzDnqz8djkV0Rrt3oibpqPnTv4sht19CjvPqI39A93K1nq5d43U+9y3P8elZ1szyZm2uy9kyo7SCWst0tzumePuJ55ZHzovNkkexF2eyR7stUf+bDeeVmwtndhdNZNEJMbuDzinc8NOHMJ8y4pKZ+3vJpHBs0Nf+0XXpg0XQU3EsEFc/3MPr4TW2E0wJlmlmSiMIMami162HSxkNDgZ9PuDgeQHo71BRJNjTn+rOfSJyJq2vUxKXa+72AauwZ8h7i5Fu8H55ePT08PVjVU/fX54fbrf3Kb+RHeVYBBSm/02p621N0W5a64SYjccrQLXFs2Zu08Sd3P/cFN16lYIxyHQ/607p1evl/3EY2erpvgVa2+/iYRzkXheM8k53VWlljTVxEwI5ub6pl6N8EqBZTnHD/cb8dn2uCm8yrMXvwG7zkqQPK82Ec1TqBgyvowxFVhzcHfj1CW4cRzrzvPdiYjhXvRrzf2Xu93tIJaKhp1woNq7tHWmvLkTsLsPSaQCyzl9FGVxNBGEgXhfbAvnAgaeuRR04mhskoyT7ZkxS53c3VSV2EVQrz8JbNpZCPLguV/Koy/Ct6xNhW/Z3ZuS0NYjMfdeXKlpJ/Dpg4Bha+/GX85cfZke7YyN+OhN4UO2toYscPcqseq5luoUXQx9QZPa0y8SwlYg/JEgPnpv18xyZoQeP8itLmuKGDo/zuO/IZgkYn+JoWjHaj+UPM4kw4VpS5BLoLexyhGPY/grtogLW/jzX5BmW8fvJ16sNkeBKcUuNAz8K18ehB2F+vF9/H3fuHQ0zE8PC+cxesYb98Z6W2nahYLLj/CzPG/GIDCpaHlrn6xG5yZKWEOwaHM7Nx9Ye8GHnpjerDtONfxPaVJaVkzCRZPLufmpCPrNmPd5qDLcunLcQrC3+NQroPdI6XB+96Ne5L/ISfjOSTiKdUBz9nnozWP0You2ruQnc70A9c8jQ8+6wF+7vS+tSy3nG/72WazD3U9DcM7Nq2DRZm5+jaHhYkRxB9S7F143+HZclobOAyrS3oRr689i0RHXWyRAzdIb56lNCsYMHvuOiIQx7Pnj/QZc5/5jWRLWb9DaD2Mnw/yUqL7LNScJ0KJ1K3KbB+TzwC/dAHrWjxCn02q9evMT6LA5LqlorPolHmjLP637CWbiLEbvDd3peQFvCt/1BJGwnkL/M+LUuvPEgoP+lVOt1+slsHQe8UgrjmDzw+HEsIKo2FPUGYtmDmIMvCk894TcyegHnOZcMxpeXN7//PX6bDm6ODpPGBmuasgptjRjVwKmqK9i9Jb5ZoGRD1TshRAwhPJ3jdjWT+/i95+c3z3daKJYfcBUFEfQm3wsdbhDYSYcvZWRhxg8OYaTP8enroYY9WN0nV+JPzK4eNDDsH6FanSLh7DHH0HPR04nE0Rvq0CvYoJM3Ak60no+4bYiOuh/N+eJtODmWSs6tG7gtzp7VHDmy9HBsEZO9Ljm3KvQQ+kbJFmLKofrGGPLcZz68fOP60tE85ulYxStY6BghwtO82Al2kPd4nlg1uPPlk8+kL6UV12lDsyPNBdaoVf6Cq5N/0nHKFo3gOAwQMXnHqpj9vCJGi7EW52xEr2KwR4d3KRPFp7rVnpi5+qSKcZLHb/GegcEueHyJodlLBYofDz7r4EeWbJHL9LyZL1TDKRSZjnvzHgPXjWksH4FLD3C89nLQ9Dr4q8bK/g3O5XsVWKL+5BRiNXrI8FIpDH8wcz+nYYirV/BeXxUD+YBNcLOBMhP0FzPFHaP8Qp79lxCCCck0slpfMyqGAxazk/2izdqHq0/wIlWwE9CKkQblgb+LvjUfrHXAqwyYw//lJ4ypNF3RLx+f3FxJT4FYd6JBo+iq9ZBHUO2EgwKoQsBe6M2wn+hgV7FBfbMaJcIpdfwJ1fokz5SXERutOoszHvUQBA8oDZXESWNBOdOA8xnLyh0qQEaAXOXbuVHdC4EK0+D1n7yOfAwv6kRrEO4xEWQlPPTZuDgeW/wL/ZanVceeEv3OWokFJwBl8DqJqOGwAGTq9nEm9CRwXPZOwkWudBCWTNBcF9quTiJgNbhPUcLOtTPxp9RbNN8bB1HhMlYlwygjulhg6lZJlTCr4IpgJGObgmhxsSgn3cq57t4duc8q2atyNHRQNCBlMc8zWkagJYTfcme2q4DfsyP2+TpeOtaRN56eJYdPELwUumsVSGrtgJa1LSzFahcGgbQfKrZ9tgANzxffqrhT2OlKefi+nf6DqWSsa6YV9eCw+kbQR9IjjLr6wlfTO9fuTaaMqiSNCyZ+FOFYBWs4AKOx7NaCsCUhFcZJj6QGgh8kNdcJ4vqlL7SBbMi1ntVeTIOGAk0XaYeARfguWARY6WNHzYA/DcfA6sv803TD0VR3smN4jnrnXFo101+XgX5kJ+B2UZajksEBsNvkGcejlmmQsO8RS70uYqRUYeO4chNnY7MGZCvyXRhR8txAfyYCss1D8cslXakjhGiYEPMaOQ8xmJBdNPISo6SCJ3UszN98ungF3lW9+pInXmYKhG0Xtkhd0BAQ01ALn0s6m9pWnYRv2zsLh7pSfTRCp47V32p6DMwFdMCA6320joVFjegrI7LdPwjfjKzzaF+rsF4lJGp8lDZEgvctB1GgioV6gP5oIavFxUhgMYtxi/iqUymKQtMeeSbGgbMneMENFQ1pSnTJih9pcgX41d4KMpTtxr1lSpNWaiMZaSvjrgExoVHOXTRF2CeWVcj4yIA8CePYXOOdBM+cq4WQXZ0lS5ygIBu4hPnAdhyb38I+Xh2QmHAI8dKHSFEztzRkeJDIAHHyZPLAQMFSEi1S0lfnAbJyZLFB6e5pCIlC0enWX1dAqIT0yxq/gHt4gXsH3e6cREAZs++qezbaWiXC5UQA+rsaEsgBD2FydA3eIZpoZZZetKN2deNSqtTFaqRymUO5pMCQYcFghjlGPnotcGYgx83K0m+kK8Zc0jz8AJUL8NvoFMwinhP9WQ98uW431yQ7AWEUEbLKc/o3aC9FLJFfROVjLIHQ2fn6KRYHYdPsVwTmAiSXxFMRvojjXx1ClCBKsz3Da3NawENp5TiXGXZULRtualCHkcxJ2dbfhgTFWhOfhAP/aqTX2FHpynfgeIhCwoS4JvkmsAXxp7guwzLo8fzu7LyQwy0EKHyuzjQ1z0qeBmyvRAa5CbrIdIDAZ2XF784P19olJ3b4hAj/S3y0uExfkzDtNmUpRfIGTT14335Ge9YAK+LyHOqEZojRM6cktqQzQYTmNP+CsYdctBnB41Co39bpNNpTKNOUSBETloxv3MfZmGLGKQBPLjaWmTmsuCC9SnIDdV/5tXPpF8jUh4KjxYZlClI700WRPQCqIhF2rMzPYQ947i4wGuk6lzL+sHjOjb+mGXS0H2WpSkglAXj3tLN6abBZG/r5yNAVYbK5xKAhegKAkKeAkxaTWYhgHkhhvNLhg4csAyQr9OpRJXAj51dEU5Bg+mcnVqahgHxc5kLqZ/UTQHGHvmpoQR+9Y3KuEGSrJiAYOIhG4ZxjAjYL8P4q3MgdpWYOXIlUMSven90oa4U0UTFRfFncJgAAhLNbJrpDHQPE79IEx2w5aQiNGjlmXAqf6BfKGnUnmg9KqQU+7RgIcDHrmVjCGBdSEBRW0hm09IBEgUMUL7niAzVn2AfaD1Xw1bUB0oJBAEEGy6ZhATnExwsqohCM7IvH+EK/a052Wdq/1gClBFmoLT11ejwhVk5EEDkwmyMBO5Yk5nGCNlQlc5y51OKCAgqdCBPAlKFz+wZRN5qZWqdKAkYPXI0hCNkg3j49kz7gR4Kdf2osJM8B7BreCN3s08xwj9lj6m8L0byUIUWPQcxBJIp7WL3GEYQ/K7B+oWhVG9V3EwuA97SJVd6Tp9pi0jxD060giUa5/avC+ZbHdaiBwrGTXdTAEbg/2OWPmoYGE1KY8jbie5lB6JHoRFwRJXze51cTP2JcfzdcV4DHpNldJszMS5gBN7LEq27Z1NXbjSRTZ8WUhAN0LXEulG6ndchr3BBLZeyFI3kCSOPKzmGUGlJ0ikGSC1B6BQ7154X+arrca0UhoS78A+yow8iBo1s1k9aRznX6Ir8iZ3MmwfZ2AQUq1sMv0ySCTxTl3nelZghvQqUIvalPFIDXcCThywFKeFCbehQv+SpTjWfRjxRtZ6+Q+uufFY5+mEPTp320LCfLtI7PZFWHgFe9ktspBMmECUNj9G3/lGnWeyj/1rUuvU1Kp7HoXZ5/R5R8eRndpCQNV0MGSKNSgo/yHyyKYd2wiY0sAX/bFIm5o3zrNmGR0rAwfPpALy4fo4ikqF4cx0Zgk2mD9ZJGIh0oRPMA0udrVOsaOBqi10ZHo0rHdnDn1LWpAe6rYJqUDWDcKg7VxGlrlMvBQ0EgpYa3EHzxzIXmdyE58KqAr9EzrdR4wh+P019bUxZsikQR8tGCET8GdWuTxOfBDxQMIBG0gCC3wZqVVJ4sCtMChclKOgR/kf6aSGsP0TqDoIMIaTQAkbC83fxV8AAJg0BAqSuwe/eSWyB5+4i2VyV8Nc8O+7puzxO6tH6+/d+/wJ95ur3ENUSMT2bOk7ME1jMBQBDnqqygMSBeZcH78aeIjgs0e8T/pk4VXfyM7kaxapSnY//VL3QCHRFcKJhMqEJDw18TcQEAZqwwK0ZS1Dw7BobWZ6XsoO1fezp9p+q+fPh1cujclOrlkXdn7iOwRpKsMqSaqSALliIe5Opa4/YhkkmuxGz/bz1PAdSPyVEcAUHd++5GIZKpqBvTfobdCiEu/DQDwotESkHDYgCUingR0xvv5r5a0HdyqgbQ5Bm7oa7Em3RxetpDorOtYabxiFa2lQVmr2s98j0t6X4oVSm8QuWo6ShbPmKTnqyXaQfQN2LbPotZ9iv+kNzU0XdcY6vXq+vHx9pBILO+TPDj+k/OzkWiPgxhc7d61Qm/2w+JsqAnuz9tIr1zOQGrZPLG/mg1dU3NYJ0gdFlfyBsaYJOBVZkabNdLak2A8DPTeEXlRM68xD8xW5KDOkamzTY43nGU/XcbTJnLh9ntH7cq7A7vb5IvOjo/O5GG7+s/NGAYvYfs2bY+t61vWpndzeQ5irRmTJ4lEY5z7+K0XsS3tDfXH67PnZQgxbxJxQzs/ozGh5MrqtTg7voSOZYibv3RWHevMvsQTGDIn6D82+vx3TGVXg8id8siR+zD2bWPhC6c6xVsCpEBs1uPMItgGd64orJE41JqjREMePR9U3WkhbqT7APNYl9JwE9UsGqFwnQMmccazQM18QFvTaZCp7F5rScxUMCbiQ5Cgjgwf6l7Pso4dUkTZgXUbU3LVMxoxUcRNCr+N31jutdrxbEvu/gR9lNG9UoDLrIfhjo0+omPE0ETMswrJcpBc8cs0UZElJNtY1e400ioes24pyOuxcWh5XlURan9zMrAaAXO+lpIkBlNy/+M7f0jO0SJKR6ic2oY61DbEYkwu4WjWm/JB43LOt9mdqTk4ofkvFRKxG/zzN42BFPdRZGdsNgDpghzVshb7KZJOpkz0UdVZtye6jRjJ1E5JhZwMHPhIWxrkXa1JLxbQcKgyyt1s3SyTMjHu0tgqZmAFhrRWorKrh1InolumUJWR+K4HGVzSInkzAshw91ogZJtYFi4VOSXwIwJky1d3dGTacyGKUgxyRiibNmM5T3s0Q1your5JrJJQFBGCc/EUoSyfxLOr8EUauXzQ/GBwrNNiP2ehdo1JWaa6rNIkMUqi97mMkLxCsMZVnuQrCq98wB/cURrLL8GfqWqRYRMOkuQ1t+4EZtModf64ymylxhlGPdR6WIkE9p0Sw9beCiE3WiMS+QAufmLrLncRk8IinMQWfyu8tE3SUvhPXMCb+5QJ2IoTq6+x8qCAs7qrxlQmOOoHJQRYrhfV9g7meWn4cWpnR+HtQqyER+94RnVGBZsjoRE0nzdAjvo5sblun3cjtRIj0YQ/WYFiUYi6J5Txi6GOYJA+8XMZ9t7COTNlf6pJQnWyjdVBDXGcXM81yldUwE9dNLmuk/5uYhWQeLARKg0DuZTmAnoUGa0a8rZ+Jxc0lkfahIZEdBGwQd7uKhl1xwXgcRglW2/GApTX9SCwXNkdE/qabG2IYz9XQL1DkZ2ejvZHmarwbKHbpWkfBmQ4ttMIgE5iHbADNJ9BeoTs5meZUtotBKwewCHdmS/AZBVaffU5gEq353a4FbChqs4abRSxWulYM5dudIJk5piF4H5pTyjExx4YoL5bxtLjj3T1bUyHzUM8TvKsIiIZiFCiZ6LlJEShUaeS+AFDUXspGKBq5W0G96zZAQvetRTnk6Vqxj8Z+KTk4JqM5lh/yOrYhUN0u7ZvkCpQNVDAUWFuL3kzRIok/GOmM6ylCPEVB5V5U54s46/ahyvsCeysMJiK1C6IZJGlzxR0xfK4cfWBu6sovZe+M+C8VP/jzveNepUsuBtQrBcHSmOk0BfAsQQHX7dURA9ZBEfEFexJ9ypw7dGOXgWR6AdYeFdNI5cQhqQQDPlALIPvpMvyRPv1zGQUMEGQF1Bqul4CTEL+O9UADfosEiC1WVqAJS09OvBlJXLM/u4IkK5yYKoMqaY4KEjKUAIieI7NM5piwwtad+juPQLQhMoKs5r2dUAZBb6rnCwTLwksj8akyGR95Xie0iPd6+KHkX+6racztJAPYEc5WzZwOcarD9GnsnWBApK9ZLnw54clkC2PKu7DaXA2tsAhMgHQ+Ie8phCFPj3NFHb2um7mlFJ18rI4OqRlulANqTb/LJ2UIBfhQwqMbwNIma0fVWh0UfI98hb8DChIMYtJqYj8sdEYckPTqnag3KlnCstQjoVeIRIBlgwUC5/EZCPpaaQAUptQ4RgzbjL32k4WNjFbGi04ROrXsRS+BXLx79lAJ09rRxbVTukhRwyiB50VGvRgEbr2Mi6Ex20RdDH61cF0wEwJ44HZ2NjTiDAqcZzH5oaJiojKH2dUDXFkaV8NnPS9PPembkCBTsGT4CEgf+vMa5GVdpDCtRm9QuZAhYgjsonwllxg/VQKZ1XgAw8aisNdZrRD2C0nx+Cr+luPNYBjhzUlqBwpQBjr8XrQJFBQAaRmMCnvkKaietQQdXe0UqGb2OMqNzFNhwy1EPj164qxYMFH4E9RBnIzIRPfWdzDaNWfL9l1iB3pUUwFPmWqPxK15wM0/q2JG6oMlsvMYKvxqlT4GqxZOVDOKxVgZfTrGgCJPu2B6jMYXLcpwaKxjp1WGdIkZmiqFsCMHIh6aHKBZM4QcGH05jeR3L9bY0uiZJq3DuFfZGaCz2EckHK+yALsoVfbjBB/t/NAgYSZZOZzZNG3TS/ZMZ/ErSry+Sr2EUbe+JAG0ZELqrsd+N9Sps1UaCRib5IYTN8Cslf1B1wGxDwW4UBCw9oARq2EC2WVSjcZlSWl4bpuCWxw9cF67edC4mw8wgLPHREqxIh2pYeVoezvX6XNXy1yzATAe6ZgWuZwzolaEN1MmQseYKdUGQ+oa5tTdSmn6wloFvcG1q3SuHEgiT8BqZNDQSCxWC1MvOS3xw+1cigGC2AV0XLfKFBMQ9P+BQaBh53FeounomqsvlOHPl/Rfc0s7Xm2quwMYD8AW1GvEdbC9WDShRBs0pi2LSWXuzDy4+Qy9ZQ3ky6CXPrLfClbCbenayts8g4P+XEkn+OqxpaccPrKIZn05t+xDQRqGN0DGCFRJ1SkhYtGG04sCdmlW5Ewrcot6ujNwJl8rNUofVAP5JsPKotaQWboDKXIMRMl5cbqNYyBNSsDBWtwxfh9W0aJVK3XGBLM2jDa0N5jajoJ8at47qRvwiJSokTUk0hfmXOz31acFGm3hVfqnL5FAl2SD0LU+njkKgldVL9v/uhWNETrZMg/Ldk5p3dcH2efRcZCtRCoBv1MdJdr0t2ITdfzhMziLTd3ArStXIUHJfLjb6qJbxMcBxcZ7SKVyLKQGMYxqY7NbbE+3ZMAaZ6IN1F8NhXNnsyev2cPOHVgUQV8/zaMQofUsXMhRaeeW9aojLjH3YRC+zXbE5elElJbNZFK27lnfGL9BBX/mAK574/jO+lv9Nr85QY5e0d/zERgCBIWkicJh2+lA96GSX+OUk6Hc2Sl3eAcAjbcxI9QI9BInHfqG3akp/waOtJelUfY39Db05eLgfnuuE2ix7fDXwyA8s01FLczS10YQ7zM+20qmlSFUmgw10XnRasS24FqGFXdJEz69OwxBtAl4EcdTOTy4kwa4Azc+WgUkyycOIGZeiPOPmf43qEV6l25mIJucQWGM/ONmD+LZ1V0555gr+6HC0ewuI26zVBJVih/LSeROmuEC7qBZFCujFl70dfgEgj+fQzIdio9svQTyeiewMh8PWaC7ecE6bIrtxOz2uo1G3EDqI3pJf/1bq5qMk8JxRDZ3Xtv4YoBH4Sa0tXK4cuWm8LIOf70SNHl7zi6rzUOFjEPM47wSXjC7mgVdzV3PR6x2OOfmbI0GH4rII1Spv6xRv2ubZyPjmzIMg9jtdZLeziTaClQapNSdLf9Rtt9gx5jg4Qa9jwowbOh/KTd43MXrI2vYHb/iNYxmOYK/c2jePGKbruoT9escHDGmZjlVzeJCSf61QBPX3LHofv6GZ343e4BtrOuNDlme6IMKd+bRpe4R2EDMNimkTxfS78wMXFC1i9D7hCnGuRBssC0jhpfxqbDrAhLzUnu3pwDjLg/C3FideHD5ZvOB61/yA6owhvjvO5SmA7AS4BnjNVcISR2kQfrtnYV3FsvgV9/G3NTSuy9GBOClm8jd2g0N2LxJ3F8dpXaqn+P3KhVvY688bfhiOnl36Uso8iGehDb4OZLhzD9i9WCG1sX8W7VnxqbNH+P3YRSNkdIaDgSD69viwa29lsI3fOuEsNvcOWp/pGfZkv90H9JX88tIix5otQomg9RaHkfvPQ0+8Ul6Yu+yNDyIh7VkmkV31+H1MBW11ztUt/sFu7FvYH3FbJBDnbRvxWOKhJMQzTtD3uM2dg2eLiBgsmlypGR+6Fl0Ggklwd7yFprc6ZEEoA3OLr8kdb7ScV068obBDofZJmlOERZzEtidxIWo9Lb8/k32lGX9Hnm5xni/5M6LCdj9w53s+zGNEPDFfNa8c4M54zTgfmzPiXz29i5e8zASD2/wEr0UGXWGNiBHEhqyzIEY5RdOwvdgvlqNXd/jCSKo342DfK+5Q+gj0JjGPeM2ZoKAXFe3B/wpdX7DjvzuQbp216tf9+O1+rFgqJCiZyS0DnZXgeJoTITbp+BNdTeO5wrai23dJ0FC3Xs/jV3ffajF31MblLmIuCwsBC8/cCf5kZ753dQqh7pvAXxfZfTaWc/woYNdb1uK/2BCU0hdBwvG0PZFJj9o7U8GmdnM/F34ju1vDct7vYrkLRbtix8Qj5MtEL4ZhYpePUUnUpYZ+4OaFFp7t2jMxgMiInuU41xvxdX4gKi5z/6FchDb44iIYr0aSaaT2bEJMI5H0DP0xu0Yms2Qu4c5K3v5ePX64PBEfGCW2QJDaF5mFLLTGNdEe1AI/KfSt7mJFk56uWTNdk1SCt+1snUrCXggr0Ky6c3p1fdlPPNDdJxyH2vQL9WYG/MRac69WmWVYp9c6647m8+5ZqzfMuPrnT7h+J8St/uPx4jb1wCi5sJlINuZ/KfRWTfHreoa30/++m1erHnrO9arjnP54vOyfpH4+9JMLtxvu+MAU/AdgHSQvFyC1iVYy6+T7lRPC6fvrz7vvfckD3R2pJVSUQT6cJTsI/NTufc80l2oibi42m9s0xTj0/CBVVbPJ7DMPXQaGLyRl0YkbasmDtXjPH7tJA9og9u73GAU5tJZ2CsPQypH9Mq0tNd40etlntlfZ5ko6avobobXMemUecb39cqSNY2u0eyNmxi8g7up32oQ86C1diVfmhRY9WPlrBXcNu/OXCZEsrPLs5u73K005DBeB9HoBWnpoGm+rWVRhGXY6aAc7nV575C92e9J0s3SjXSlmMPvaQKEkjMYkz7WO9hO7brMZMvJkOn2bBLSe65qGnVMN9mw74YX/HdBaTFxbFcZ7DIoeoSr4bxC7LHS6LxU1ioVAXLJb/3WkE6A785paW3qz4BmuvfyrkWNw5o8rhpHtCilCLdS23nTxd7KlBIbdxXZim3kKRIAGDQ2NYPwBr+cPQac1mq3eCNOTMhNAQsxcY7J9mZ/9VaagDHR6Z/PFbDUN7NA8hPEuBZfaCiOYbpeLebv398ubHoSYtrvr9Wi07nbPep3/K2j9g3/wD/4/w/8AUrStUfoHQN8AAAAASUVORK5CYII="/>
+          <p:cNvSpPr>
+            <a:spLocks noChangeAspect="1" noChangeArrowheads="1"/>
+          </p:cNvSpPr>
+          <p:nvPr/>
+        </p:nvSpPr>
+        <p:spPr bwMode="auto">
+          <a:xfrm>
+            <a:off x="155575" y="-144463"/>
+            <a:ext cx="304800" cy="304801"/>
+          </a:xfrm>
+          <a:prstGeom prst="rect">
+            <a:avLst/>
+          </a:prstGeom>
+          <a:noFill/>
+          <a:extLst>
+            <a:ext uri="{909E8E84-426E-40DD-AFC4-6F175D3DCCD1}">
+              <a14:hiddenFill xmlns:a14="http://schemas.microsoft.com/office/drawing/2010/main">
+                <a:solidFill>
+                  <a:srgbClr val="FFFFFF"/>
+                </a:solidFill>
+              </a14:hiddenFill>
+            </a:ext>
+          </a:extLst>
+        </p:spPr>
+        <p:txBody>
+          <a:bodyPr vert="horz" wrap="square" lIns="91440" tIns="45720" rIns="91440" bIns="45720" numCol="1" anchor="t" anchorCtr="0" compatLnSpc="1">
+            <a:prstTxWarp prst="textNoShape">
+              <a:avLst/>
+            </a:prstTxWarp>
+          </a:bodyPr>
+          <a:lstStyle/>
+          <a:p>
+            <a:endParaRPr lang="en-US"/>
+          </a:p>
+        </p:txBody>
+      </p:sp>
+      <p:sp>
+        <p:nvSpPr>
+          <p:cNvPr id="6" name="AutoShape 6" descr="data:image/png;base64,iVBORw0KGgoAAAANSUhEUgAAAN8AAADiCAMAAAD5w+JtAAAAyVBMVEX///8TTmHoeRLncgAARFkASFwAQVcAQlfncwDndQAARlvncAASTWEAPlQLS18AO1Lg5+nV3uH4+vvJ1Nj//vyfsrnq7/H99Oz++fPoeQDw9PW7yM1VeYYxYXE8aHfa4uWDnKX76t2ywceVqrJ5lJ5khJD42cP20rjriz3DztLvqXTqhCr87+QfV2n54tFbfYr0xqXzvpjtl1VujJfxs4Xuo2z0xqP31bvqhS1/maLun2Lsk0zytopJb345ZXXrijsAMkzrkU/xs31bGmXbAAAfeUlEQVR4nO09C1ujSrLG0CRAIC9JYl7GPNSoJGp0Rp2J7s7//1GXpquaBhq6iToz996pb/fbPUfELur97KOjf/AP/sE/+Af/4B/8g38gQuds5C+W22lQMZsMzEow3S4X/uis86cP9xHoDLv+yzhouqZhEOJ5lRg8jxDDMF03GL/43eH/PjSHbX83tV3DTqCVBc+zDdee7vz28E8fWR/O/G1ghqgVYpbAkhhmsPXbf/rgOtBdBrZB9HETcLSD5fpPH78Y1jvTJV6jNHIMGh4x3dXoTyORB+1ZxSUHohYDccmy+/cpnJ6/d+0cwoXK0jZqobZ0m+F/XTPUp7ZN8nmYuG+L3p9GKAFny4opO65nm27Te9u+LPz5un3W6vV6rfZ67vuL2XL75jXdmlwLeUZl9/dom+7YzpKuQYymvZ/N251cZusM2/PZ1GxKkSTG9O+QxPUkI3WhLjQqW7+l94LWfBcQM8uunhvMv/boGrCeusmDNTzDnqz8djkV0Rrt3oibpqPnTv4sht19CjvPqI39A93K1nq5d43U+9y3P8elZ1szyZm2uy9kyo7SCWst0tzumePuJ55ZHzovNkkexF2eyR7stUf+bDeeVmwtndhdNZNEJMbuDzinc8NOHMJ8y4pKZ+3vJpHBs0Nf+0XXpg0XQU3EsEFc/3MPr4TW2E0wJlmlmSiMIMami162HSxkNDgZ9PuDgeQHo71BRJNjTn+rOfSJyJq2vUxKXa+72AauwZ8h7i5Fu8H55ePT08PVjVU/fX54fbrf3Kb+RHeVYBBSm/02p621N0W5a64SYjccrQLXFs2Zu08Sd3P/cFN16lYIxyHQ/607p1evl/3EY2erpvgVa2+/iYRzkXheM8k53VWlljTVxEwI5ub6pl6N8EqBZTnHD/cb8dn2uCm8yrMXvwG7zkqQPK82Ec1TqBgyvowxFVhzcHfj1CW4cRzrzvPdiYjhXvRrzf2Xu93tIJaKhp1woNq7tHWmvLkTsLsPSaQCyzl9FGVxNBGEgXhfbAvnAgaeuRR04mhskoyT7ZkxS53c3VSV2EVQrz8JbNpZCPLguV/Koy/Ct6xNhW/Z3ZuS0NYjMfdeXKlpJ/Dpg4Bha+/GX85cfZke7YyN+OhN4UO2toYscPcqseq5luoUXQx9QZPa0y8SwlYg/JEgPnpv18xyZoQeP8itLmuKGDo/zuO/IZgkYn+JoWjHaj+UPM4kw4VpS5BLoLexyhGPY/grtogLW/jzX5BmW8fvJ16sNkeBKcUuNAz8K18ehB2F+vF9/H3fuHQ0zE8PC+cxesYb98Z6W2nahYLLj/CzPG/GIDCpaHlrn6xG5yZKWEOwaHM7Nx9Ye8GHnpjerDtONfxPaVJaVkzCRZPLufmpCPrNmPd5qDLcunLcQrC3+NQroPdI6XB+96Ne5L/ISfjOSTiKdUBz9nnozWP0You2ruQnc70A9c8jQ8+6wF+7vS+tSy3nG/72WazD3U9DcM7Nq2DRZm5+jaHhYkRxB9S7F143+HZclobOAyrS3oRr689i0RHXWyRAzdIb56lNCsYMHvuOiIQx7Pnj/QZc5/5jWRLWb9DaD2Mnw/yUqL7LNScJ0KJ1K3KbB+TzwC/dAHrWjxCn02q9evMT6LA5LqlorPolHmjLP637CWbiLEbvDd3peQFvCt/1BJGwnkL/M+LUuvPEgoP+lVOt1+slsHQe8UgrjmDzw+HEsIKo2FPUGYtmDmIMvCk894TcyegHnOZcMxpeXN7//PX6bDm6ODpPGBmuasgptjRjVwKmqK9i9Jb5ZoGRD1TshRAwhPJ3jdjWT+/i95+c3z3daKJYfcBUFEfQm3wsdbhDYSYcvZWRhxg8OYaTP8enroYY9WN0nV+JPzK4eNDDsH6FanSLh7DHH0HPR04nE0Rvq0CvYoJM3Ak60no+4bYiOuh/N+eJtODmWSs6tG7gtzp7VHDmy9HBsEZO9Ljm3KvQQ+kbJFmLKofrGGPLcZz68fOP60tE85ulYxStY6BghwtO82Al2kPd4nlg1uPPlk8+kL6UV12lDsyPNBdaoVf6Cq5N/0nHKFo3gOAwQMXnHqpj9vCJGi7EW52xEr2KwR4d3KRPFp7rVnpi5+qSKcZLHb/GegcEueHyJodlLBYofDz7r4EeWbJHL9LyZL1TDKRSZjnvzHgPXjWksH4FLD3C89nLQ9Dr4q8bK/g3O5XsVWKL+5BRiNXrI8FIpDH8wcz+nYYirV/BeXxUD+YBNcLOBMhP0FzPFHaP8Qp79lxCCCck0slpfMyqGAxazk/2izdqHq0/wIlWwE9CKkQblgb+LvjUfrHXAqwyYw//lJ4ypNF3RLx+f3FxJT4FYd6JBo+iq9ZBHUO2EgwKoQsBe6M2wn+hgV7FBfbMaJcIpdfwJ1fokz5SXERutOoszHvUQBA8oDZXESWNBOdOA8xnLyh0qQEaAXOXbuVHdC4EK0+D1n7yOfAwv6kRrEO4xEWQlPPTZuDgeW/wL/ZanVceeEv3OWokFJwBl8DqJqOGwAGTq9nEm9CRwXPZOwkWudBCWTNBcF9quTiJgNbhPUcLOtTPxp9RbNN8bB1HhMlYlwygjulhg6lZJlTCr4IpgJGObgmhxsSgn3cq57t4duc8q2atyNHRQNCBlMc8zWkagJYTfcme2q4DfsyP2+TpeOtaRN56eJYdPELwUumsVSGrtgJa1LSzFahcGgbQfKrZ9tgANzxffqrhT2OlKefi+nf6DqWSsa6YV9eCw+kbQR9IjjLr6wlfTO9fuTaaMqiSNCyZ+FOFYBWs4AKOx7NaCsCUhFcZJj6QGgh8kNdcJ4vqlL7SBbMi1ntVeTIOGAk0XaYeARfguWARY6WNHzYA/DcfA6sv803TD0VR3smN4jnrnXFo101+XgX5kJ+B2UZajksEBsNvkGcejlmmQsO8RS70uYqRUYeO4chNnY7MGZCvyXRhR8txAfyYCss1D8cslXakjhGiYEPMaOQ8xmJBdNPISo6SCJ3UszN98ungF3lW9+pInXmYKhG0Xtkhd0BAQ01ALn0s6m9pWnYRv2zsLh7pSfTRCp47V32p6DMwFdMCA6320joVFjegrI7LdPwjfjKzzaF+rsF4lJGp8lDZEgvctB1GgioV6gP5oIavFxUhgMYtxi/iqUymKQtMeeSbGgbMneMENFQ1pSnTJih9pcgX41d4KMpTtxr1lSpNWaiMZaSvjrgExoVHOXTRF2CeWVcj4yIA8CePYXOOdBM+cq4WQXZ0lS5ygIBu4hPnAdhyb38I+Xh2QmHAI8dKHSFEztzRkeJDIAHHyZPLAQMFSEi1S0lfnAbJyZLFB6e5pCIlC0enWX1dAqIT0yxq/gHt4gXsH3e6cREAZs++qezbaWiXC5UQA+rsaEsgBD2FydA3eIZpoZZZetKN2deNSqtTFaqRymUO5pMCQYcFghjlGPnotcGYgx83K0m+kK8Zc0jz8AJUL8NvoFMwinhP9WQ98uW431yQ7AWEUEbLKc/o3aC9FLJFfROVjLIHQ2fn6KRYHYdPsVwTmAiSXxFMRvojjXx1ClCBKsz3Da3NawENp5TiXGXZULRtualCHkcxJ2dbfhgTFWhOfhAP/aqTX2FHpynfgeIhCwoS4JvkmsAXxp7guwzLo8fzu7LyQwy0EKHyuzjQ1z0qeBmyvRAa5CbrIdIDAZ2XF784P19olJ3b4hAj/S3y0uExfkzDtNmUpRfIGTT14335Ge9YAK+LyHOqEZojRM6cktqQzQYTmNP+CsYdctBnB41Co39bpNNpTKNOUSBETloxv3MfZmGLGKQBPLjaWmTmsuCC9SnIDdV/5tXPpF8jUh4KjxYZlClI700WRPQCqIhF2rMzPYQ947i4wGuk6lzL+sHjOjb+mGXS0H2WpSkglAXj3tLN6abBZG/r5yNAVYbK5xKAhegKAkKeAkxaTWYhgHkhhvNLhg4csAyQr9OpRJXAj51dEU5Bg+mcnVqahgHxc5kLqZ/UTQHGHvmpoQR+9Y3KuEGSrJiAYOIhG4ZxjAjYL8P4q3MgdpWYOXIlUMSven90oa4U0UTFRfFncJgAAhLNbJrpDHQPE79IEx2w5aQiNGjlmXAqf6BfKGnUnmg9KqQU+7RgIcDHrmVjCGBdSEBRW0hm09IBEgUMUL7niAzVn2AfaD1Xw1bUB0oJBAEEGy6ZhATnExwsqohCM7IvH+EK/a052Wdq/1gClBFmoLT11ejwhVk5EEDkwmyMBO5Yk5nGCNlQlc5y51OKCAgqdCBPAlKFz+wZRN5qZWqdKAkYPXI0hCNkg3j49kz7gR4Kdf2osJM8B7BreCN3s08xwj9lj6m8L0byUIUWPQcxBJIp7WL3GEYQ/K7B+oWhVG9V3EwuA97SJVd6Tp9pi0jxD060giUa5/avC+ZbHdaiBwrGTXdTAEbg/2OWPmoYGE1KY8jbie5lB6JHoRFwRJXze51cTP2JcfzdcV4DHpNldJszMS5gBN7LEq27Z1NXbjSRTZ8WUhAN0LXEulG6ndchr3BBLZeyFI3kCSOPKzmGUGlJ0ikGSC1B6BQ7154X+arrca0UhoS78A+yow8iBo1s1k9aRznX6Ir8iZ3MmwfZ2AQUq1sMv0ySCTxTl3nelZghvQqUIvalPFIDXcCThywFKeFCbehQv+SpTjWfRjxRtZ6+Q+uufFY5+mEPTp320LCfLtI7PZFWHgFe9ktspBMmECUNj9G3/lGnWeyj/1rUuvU1Kp7HoXZ5/R5R8eRndpCQNV0MGSKNSgo/yHyyKYd2wiY0sAX/bFIm5o3zrNmGR0rAwfPpALy4fo4ikqF4cx0Zgk2mD9ZJGIh0oRPMA0udrVOsaOBqi10ZHo0rHdnDn1LWpAe6rYJqUDWDcKg7VxGlrlMvBQ0EgpYa3EHzxzIXmdyE58KqAr9EzrdR4wh+P019bUxZsikQR8tGCET8GdWuTxOfBDxQMIBG0gCC3wZqVVJ4sCtMChclKOgR/kf6aSGsP0TqDoIMIaTQAkbC83fxV8AAJg0BAqSuwe/eSWyB5+4i2VyV8Nc8O+7puzxO6tH6+/d+/wJ95ur3ENUSMT2bOk7ME1jMBQBDnqqygMSBeZcH78aeIjgs0e8T/pk4VXfyM7kaxapSnY//VL3QCHRFcKJhMqEJDw18TcQEAZqwwK0ZS1Dw7BobWZ6XsoO1fezp9p+q+fPh1cujclOrlkXdn7iOwRpKsMqSaqSALliIe5Opa4/YhkkmuxGz/bz1PAdSPyVEcAUHd++5GIZKpqBvTfobdCiEu/DQDwotESkHDYgCUingR0xvv5r5a0HdyqgbQ5Bm7oa7Em3RxetpDorOtYabxiFa2lQVmr2s98j0t6X4oVSm8QuWo6ShbPmKTnqyXaQfQN2LbPotZ9iv+kNzU0XdcY6vXq+vHx9pBILO+TPDj+k/OzkWiPgxhc7d61Qm/2w+JsqAnuz9tIr1zOQGrZPLG/mg1dU3NYJ0gdFlfyBsaYJOBVZkabNdLak2A8DPTeEXlRM68xD8xW5KDOkamzTY43nGU/XcbTJnLh9ntH7cq7A7vb5IvOjo/O5GG7+s/NGAYvYfs2bY+t61vWpndzeQ5irRmTJ4lEY5z7+K0XsS3tDfXH67PnZQgxbxJxQzs/ozGh5MrqtTg7voSOZYibv3RWHevMvsQTGDIn6D82+vx3TGVXg8id8siR+zD2bWPhC6c6xVsCpEBs1uPMItgGd64orJE41JqjREMePR9U3WkhbqT7APNYl9JwE9UsGqFwnQMmccazQM18QFvTaZCp7F5rScxUMCbiQ5Cgjgwf6l7Pso4dUkTZgXUbU3LVMxoxUcRNCr+N31jutdrxbEvu/gR9lNG9UoDLrIfhjo0+omPE0ETMswrJcpBc8cs0UZElJNtY1e400ioes24pyOuxcWh5XlURan9zMrAaAXO+lpIkBlNy/+M7f0jO0SJKR6ic2oY61DbEYkwu4WjWm/JB43LOt9mdqTk4ofkvFRKxG/zzN42BFPdRZGdsNgDpghzVshb7KZJOpkz0UdVZtye6jRjJ1E5JhZwMHPhIWxrkXa1JLxbQcKgyyt1s3SyTMjHu0tgqZmAFhrRWorKrh1InolumUJWR+K4HGVzSInkzAshw91ogZJtYFi4VOSXwIwJky1d3dGTacyGKUgxyRiibNmM5T3s0Q1your5JrJJQFBGCc/EUoSyfxLOr8EUauXzQ/GBwrNNiP2ehdo1JWaa6rNIkMUqi97mMkLxCsMZVnuQrCq98wB/cURrLL8GfqWqRYRMOkuQ1t+4EZtModf64ymylxhlGPdR6WIkE9p0Sw9beCiE3WiMS+QAufmLrLncRk8IinMQWfyu8tE3SUvhPXMCb+5QJ2IoTq6+x8qCAs7qrxlQmOOoHJQRYrhfV9g7meWn4cWpnR+HtQqyER+94RnVGBZsjoRE0nzdAjvo5sblun3cjtRIj0YQ/WYFiUYi6J5Txi6GOYJA+8XMZ9t7COTNlf6pJQnWyjdVBDXGcXM81yldUwE9dNLmuk/5uYhWQeLARKg0DuZTmAnoUGa0a8rZ+Jxc0lkfahIZEdBGwQd7uKhl1xwXgcRglW2/GApTX9SCwXNkdE/qabG2IYz9XQL1DkZ2ejvZHmarwbKHbpWkfBmQ4ttMIgE5iHbADNJ9BeoTs5meZUtotBKwewCHdmS/AZBVaffU5gEq353a4FbChqs4abRSxWulYM5dudIJk5piF4H5pTyjExx4YoL5bxtLjj3T1bUyHzUM8TvKsIiIZiFCiZ6LlJEShUaeS+AFDUXspGKBq5W0G96zZAQvetRTnk6Vqxj8Z+KTk4JqM5lh/yOrYhUN0u7ZvkCpQNVDAUWFuL3kzRIok/GOmM6ylCPEVB5V5U54s46/ahyvsCeysMJiK1C6IZJGlzxR0xfK4cfWBu6sovZe+M+C8VP/jzveNepUsuBtQrBcHSmOk0BfAsQQHX7dURA9ZBEfEFexJ9ypw7dGOXgWR6AdYeFdNI5cQhqQQDPlALIPvpMvyRPv1zGQUMEGQF1Bqul4CTEL+O9UADfosEiC1WVqAJS09OvBlJXLM/u4IkK5yYKoMqaY4KEjKUAIieI7NM5piwwtad+juPQLQhMoKs5r2dUAZBb6rnCwTLwksj8akyGR95Xie0iPd6+KHkX+6racztJAPYEc5WzZwOcarD9GnsnWBApK9ZLnw54clkC2PKu7DaXA2tsAhMgHQ+Ie8phCFPj3NFHb2um7mlFJ18rI4OqRlulANqTb/LJ2UIBfhQwqMbwNIma0fVWh0UfI98hb8DChIMYtJqYj8sdEYckPTqnag3KlnCstQjoVeIRIBlgwUC5/EZCPpaaQAUptQ4RgzbjL32k4WNjFbGi04ROrXsRS+BXLx79lAJ09rRxbVTukhRwyiB50VGvRgEbr2Mi6Ex20RdDH61cF0wEwJ44HZ2NjTiDAqcZzH5oaJiojKH2dUDXFkaV8NnPS9PPembkCBTsGT4CEgf+vMa5GVdpDCtRm9QuZAhYgjsonwllxg/VQKZ1XgAw8aisNdZrRD2C0nx+Cr+luPNYBjhzUlqBwpQBjr8XrQJFBQAaRmMCnvkKaietQQdXe0UqGb2OMqNzFNhwy1EPj164qxYMFH4E9RBnIzIRPfWdzDaNWfL9l1iB3pUUwFPmWqPxK15wM0/q2JG6oMlsvMYKvxqlT4GqxZOVDOKxVgZfTrGgCJPu2B6jMYXLcpwaKxjp1WGdIkZmiqFsCMHIh6aHKBZM4QcGH05jeR3L9bY0uiZJq3DuFfZGaCz2EckHK+yALsoVfbjBB/t/NAgYSZZOZzZNG3TS/ZMZ/ErSry+Sr2EUbe+JAG0ZELqrsd+N9Sps1UaCRib5IYTN8Cslf1B1wGxDwW4UBCw9oARq2EC2WVSjcZlSWl4bpuCWxw9cF67edC4mw8wgLPHREqxIh2pYeVoezvX6XNXy1yzATAe6ZgWuZwzolaEN1MmQseYKdUGQ+oa5tTdSmn6wloFvcG1q3SuHEgiT8BqZNDQSCxWC1MvOS3xw+1cigGC2AV0XLfKFBMQ9P+BQaBh53FeounomqsvlOHPl/Rfc0s7Xm2quwMYD8AW1GvEdbC9WDShRBs0pi2LSWXuzDy4+Qy9ZQ3ky6CXPrLfClbCbenayts8g4P+XEkn+OqxpaccPrKIZn05t+xDQRqGN0DGCFRJ1SkhYtGG04sCdmlW5Ewrcot6ujNwJl8rNUofVAP5JsPKotaQWboDKXIMRMl5cbqNYyBNSsDBWtwxfh9W0aJVK3XGBLM2jDa0N5jajoJ8at47qRvwiJSokTUk0hfmXOz31acFGm3hVfqnL5FAl2SD0LU+njkKgldVL9v/uhWNETrZMg/Ldk5p3dcH2efRcZCtRCoBv1MdJdr0t2ITdfzhMziLTd3ArStXIUHJfLjb6qJbxMcBxcZ7SKVyLKQGMYxqY7NbbE+3ZMAaZ6IN1F8NhXNnsyev2cPOHVgUQV8/zaMQofUsXMhRaeeW9aojLjH3YRC+zXbE5elElJbNZFK27lnfGL9BBX/mAK574/jO+lv9Nr85QY5e0d/zERgCBIWkicJh2+lA96GSX+OUk6Hc2Sl3eAcAjbcxI9QI9BInHfqG3akp/waOtJelUfY39Db05eLgfnuuE2ix7fDXwyA8s01FLczS10YQ7zM+20qmlSFUmgw10XnRasS24FqGFXdJEz69OwxBtAl4EcdTOTy4kwa4Azc+WgUkyycOIGZeiPOPmf43qEV6l25mIJucQWGM/ONmD+LZ1V0555gr+6HC0ewuI26zVBJVih/LSeROmuEC7qBZFCujFl70dfgEgj+fQzIdio9svQTyeiewMh8PWaC7ecE6bIrtxOz2uo1G3EDqI3pJf/1bq5qMk8JxRDZ3Xtv4YoBH4Sa0tXK4cuWm8LIOf70SNHl7zi6rzUOFjEPM47wSXjC7mgVdzV3PR6x2OOfmbI0GH4rII1Spv6xRv2ubZyPjmzIMg9jtdZLeziTaClQapNSdLf9Rtt9gx5jg4Qa9jwowbOh/KTd43MXrI2vYHb/iNYxmOYK/c2jePGKbruoT9escHDGmZjlVzeJCSf61QBPX3LHofv6GZ343e4BtrOuNDlme6IMKd+bRpe4R2EDMNimkTxfS78wMXFC1i9D7hCnGuRBssC0jhpfxqbDrAhLzUnu3pwDjLg/C3FideHD5ZvOB61/yA6owhvjvO5SmA7AS4BnjNVcISR2kQfrtnYV3FsvgV9/G3NTSuy9GBOClm8jd2g0N2LxJ3F8dpXaqn+P3KhVvY688bfhiOnl36Uso8iGehDb4OZLhzD9i9WCG1sX8W7VnxqbNH+P3YRSNkdIaDgSD69viwa29lsI3fOuEsNvcOWp/pGfZkv90H9JX88tIix5otQomg9RaHkfvPQ0+8Ul6Yu+yNDyIh7VkmkV31+H1MBW11ztUt/sFu7FvYH3FbJBDnbRvxWOKhJMQzTtD3uM2dg2eLiBgsmlypGR+6Fl0Ggklwd7yFprc6ZEEoA3OLr8kdb7ScV068obBDofZJmlOERZzEtidxIWo9Lb8/k32lGX9Hnm5xni/5M6LCdj9w53s+zGNEPDFfNa8c4M54zTgfmzPiXz29i5e8zASD2/wEr0UGXWGNiBHEhqyzIEY5RdOwvdgvlqNXd/jCSKo342DfK+5Q+gj0JjGPeM2ZoKAXFe3B/wpdX7DjvzuQbp216tf9+O1+rFgqJCiZyS0DnZXgeJoTITbp+BNdTeO5wrai23dJ0FC3Xs/jV3ffajF31MblLmIuCwsBC8/cCf5kZ753dQqh7pvAXxfZfTaWc/woYNdb1uK/2BCU0hdBwvG0PZFJj9o7U8GmdnM/F34ju1vDct7vYrkLRbtix8Qj5MtEL4ZhYpePUUnUpYZ+4OaFFp7t2jMxgMiInuU41xvxdX4gKi5z/6FchDb44iIYr0aSaaT2bEJMI5H0DP0xu0Yms2Qu4c5K3v5ePX64PBEfGCW2QJDaF5mFLLTGNdEe1AI/KfSt7mJFk56uWTNdk1SCt+1snUrCXggr0Ky6c3p1fdlPPNDdJxyH2vQL9WYG/MRac69WmWVYp9c6647m8+5ZqzfMuPrnT7h+J8St/uPx4jb1wCi5sJlINuZ/KfRWTfHreoa30/++m1erHnrO9arjnP54vOyfpH4+9JMLtxvu+MAU/AdgHSQvFyC1iVYy6+T7lRPC6fvrz7vvfckD3R2pJVSUQT6cJTsI/NTufc80l2oibi42m9s0xTj0/CBVVbPJ7DMPXQaGLyRl0YkbasmDtXjPH7tJA9og9u73GAU5tJZ2CsPQypH9Mq0tNd40etlntlfZ5ko6avobobXMemUecb39cqSNY2u0eyNmxi8g7up32oQ86C1diVfmhRY9WPlrBXcNu/OXCZEsrPLs5u73K005DBeB9HoBWnpoGm+rWVRhGXY6aAc7nV575C92e9J0s3SjXSlmMPvaQKEkjMYkz7WO9hO7brMZMvJkOn2bBLSe65qGnVMN9mw74YX/HdBaTFxbFcZ7DIoeoSr4bxC7LHS6LxU1ioVAXLJb/3WkE6A785paW3qz4BmuvfyrkWNw5o8rhpHtCilCLdS23nTxd7KlBIbdxXZim3kKRIAGDQ2NYPwBr+cPQac1mq3eCNOTMhNAQsxcY7J9mZ/9VaagDHR6Z/PFbDUN7NA8hPEuBZfaCiOYbpeLebv398ubHoSYtrvr9Wi07nbPep3/K2j9g3/wD/4/w/8AUrStUfoHQN8AAAAASUVORK5CYII="/>
+          <p:cNvSpPr>
+            <a:spLocks noChangeAspect="1" noChangeArrowheads="1"/>
+          </p:cNvSpPr>
+          <p:nvPr/>
+        </p:nvSpPr>
+        <p:spPr bwMode="auto">
+          <a:xfrm>
+            <a:off x="307975" y="7937"/>
+            <a:ext cx="304800" cy="304801"/>
+          </a:xfrm>
+          <a:prstGeom prst="rect">
+            <a:avLst/>
+          </a:prstGeom>
+          <a:noFill/>
+          <a:extLst>
+            <a:ext uri="{909E8E84-426E-40DD-AFC4-6F175D3DCCD1}">
+              <a14:hiddenFill xmlns:a14="http://schemas.microsoft.com/office/drawing/2010/main">
+                <a:solidFill>
+                  <a:srgbClr val="FFFFFF"/>
+                </a:solidFill>
+              </a14:hiddenFill>
+            </a:ext>
+          </a:extLst>
+        </p:spPr>
+        <p:txBody>
+          <a:bodyPr vert="horz" wrap="square" lIns="91440" tIns="45720" rIns="91440" bIns="45720" numCol="1" anchor="t" anchorCtr="0" compatLnSpc="1">
+            <a:prstTxWarp prst="textNoShape">
+              <a:avLst/>
+            </a:prstTxWarp>
+          </a:bodyPr>
+          <a:lstStyle/>
+          <a:p>
+            <a:endParaRPr lang="en-US"/>
+          </a:p>
+        </p:txBody>
+      </p:sp>
+      <p:sp>
+        <p:nvSpPr>
+          <p:cNvPr id="7" name="AutoShape 8" descr="data:image/png;base64,iVBORw0KGgoAAAANSUhEUgAAAN8AAADiCAMAAAD5w+JtAAAAyVBMVEX///8TTmHoeRLncgAARFkASFwAQVcAQlfncwDndQAARlvncAASTWEAPlQLS18AO1Lg5+nV3uH4+vvJ1Nj//vyfsrnq7/H99Oz++fPoeQDw9PW7yM1VeYYxYXE8aHfa4uWDnKX76t2ywceVqrJ5lJ5khJD42cP20rjriz3DztLvqXTqhCr87+QfV2n54tFbfYr0xqXzvpjtl1VujJfxs4Xuo2z0xqP31bvqhS1/maLun2Lsk0zytopJb345ZXXrijsAMkzrkU/xs31bGmXbAAAfeUlEQVR4nO09C1ujSrLG0CRAIC9JYl7GPNSoJGp0Rp2J7s7//1GXpquaBhq6iToz996pb/fbPUfELur97KOjf/AP/sE/+Af/4B/8g38gQuds5C+W22lQMZsMzEow3S4X/uis86cP9xHoDLv+yzhouqZhEOJ5lRg8jxDDMF03GL/43eH/PjSHbX83tV3DTqCVBc+zDdee7vz28E8fWR/O/G1ghqgVYpbAkhhmsPXbf/rgOtBdBrZB9HETcLSD5fpPH78Y1jvTJV6jNHIMGh4x3dXoTyORB+1ZxSUHohYDccmy+/cpnJ6/d+0cwoXK0jZqobZ0m+F/XTPUp7ZN8nmYuG+L3p9GKAFny4opO65nm27Te9u+LPz5un3W6vV6rfZ67vuL2XL75jXdmlwLeUZl9/dom+7YzpKuQYymvZ/N251cZusM2/PZ1GxKkSTG9O+QxPUkI3WhLjQqW7+l94LWfBcQM8uunhvMv/boGrCeusmDNTzDnqz8djkV0Rrt3oibpqPnTv4sht19CjvPqI39A93K1nq5d43U+9y3P8elZ1szyZm2uy9kyo7SCWst0tzumePuJ55ZHzovNkkexF2eyR7stUf+bDeeVmwtndhdNZNEJMbuDzinc8NOHMJ8y4pKZ+3vJpHBs0Nf+0XXpg0XQU3EsEFc/3MPr4TW2E0wJlmlmSiMIMami162HSxkNDgZ9PuDgeQHo71BRJNjTn+rOfSJyJq2vUxKXa+72AauwZ8h7i5Fu8H55ePT08PVjVU/fX54fbrf3Kb+RHeVYBBSm/02p621N0W5a64SYjccrQLXFs2Zu08Sd3P/cFN16lYIxyHQ/607p1evl/3EY2erpvgVa2+/iYRzkXheM8k53VWlljTVxEwI5ub6pl6N8EqBZTnHD/cb8dn2uCm8yrMXvwG7zkqQPK82Ec1TqBgyvowxFVhzcHfj1CW4cRzrzvPdiYjhXvRrzf2Xu93tIJaKhp1woNq7tHWmvLkTsLsPSaQCyzl9FGVxNBGEgXhfbAvnAgaeuRR04mhskoyT7ZkxS53c3VSV2EVQrz8JbNpZCPLguV/Koy/Ct6xNhW/Z3ZuS0NYjMfdeXKlpJ/Dpg4Bha+/GX85cfZke7YyN+OhN4UO2toYscPcqseq5luoUXQx9QZPa0y8SwlYg/JEgPnpv18xyZoQeP8itLmuKGDo/zuO/IZgkYn+JoWjHaj+UPM4kw4VpS5BLoLexyhGPY/grtogLW/jzX5BmW8fvJ16sNkeBKcUuNAz8K18ehB2F+vF9/H3fuHQ0zE8PC+cxesYb98Z6W2nahYLLj/CzPG/GIDCpaHlrn6xG5yZKWEOwaHM7Nx9Ye8GHnpjerDtONfxPaVJaVkzCRZPLufmpCPrNmPd5qDLcunLcQrC3+NQroPdI6XB+96Ne5L/ISfjOSTiKdUBz9nnozWP0You2ruQnc70A9c8jQ8+6wF+7vS+tSy3nG/72WazD3U9DcM7Nq2DRZm5+jaHhYkRxB9S7F143+HZclobOAyrS3oRr689i0RHXWyRAzdIb56lNCsYMHvuOiIQx7Pnj/QZc5/5jWRLWb9DaD2Mnw/yUqL7LNScJ0KJ1K3KbB+TzwC/dAHrWjxCn02q9evMT6LA5LqlorPolHmjLP637CWbiLEbvDd3peQFvCt/1BJGwnkL/M+LUuvPEgoP+lVOt1+slsHQe8UgrjmDzw+HEsIKo2FPUGYtmDmIMvCk894TcyegHnOZcMxpeXN7//PX6bDm6ODpPGBmuasgptjRjVwKmqK9i9Jb5ZoGRD1TshRAwhPJ3jdjWT+/i95+c3z3daKJYfcBUFEfQm3wsdbhDYSYcvZWRhxg8OYaTP8enroYY9WN0nV+JPzK4eNDDsH6FanSLh7DHH0HPR04nE0Rvq0CvYoJM3Ak60no+4bYiOuh/N+eJtODmWSs6tG7gtzp7VHDmy9HBsEZO9Ljm3KvQQ+kbJFmLKofrGGPLcZz68fOP60tE85ulYxStY6BghwtO82Al2kPd4nlg1uPPlk8+kL6UV12lDsyPNBdaoVf6Cq5N/0nHKFo3gOAwQMXnHqpj9vCJGi7EW52xEr2KwR4d3KRPFp7rVnpi5+qSKcZLHb/GegcEueHyJodlLBYofDz7r4EeWbJHL9LyZL1TDKRSZjnvzHgPXjWksH4FLD3C89nLQ9Dr4q8bK/g3O5XsVWKL+5BRiNXrI8FIpDH8wcz+nYYirV/BeXxUD+YBNcLOBMhP0FzPFHaP8Qp79lxCCCck0slpfMyqGAxazk/2izdqHq0/wIlWwE9CKkQblgb+LvjUfrHXAqwyYw//lJ4ypNF3RLx+f3FxJT4FYd6JBo+iq9ZBHUO2EgwKoQsBe6M2wn+hgV7FBfbMaJcIpdfwJ1fokz5SXERutOoszHvUQBA8oDZXESWNBOdOA8xnLyh0qQEaAXOXbuVHdC4EK0+D1n7yOfAwv6kRrEO4xEWQlPPTZuDgeW/wL/ZanVceeEv3OWokFJwBl8DqJqOGwAGTq9nEm9CRwXPZOwkWudBCWTNBcF9quTiJgNbhPUcLOtTPxp9RbNN8bB1HhMlYlwygjulhg6lZJlTCr4IpgJGObgmhxsSgn3cq57t4duc8q2atyNHRQNCBlMc8zWkagJYTfcme2q4DfsyP2+TpeOtaRN56eJYdPELwUumsVSGrtgJa1LSzFahcGgbQfKrZ9tgANzxffqrhT2OlKefi+nf6DqWSsa6YV9eCw+kbQR9IjjLr6wlfTO9fuTaaMqiSNCyZ+FOFYBWs4AKOx7NaCsCUhFcZJj6QGgh8kNdcJ4vqlL7SBbMi1ntVeTIOGAk0XaYeARfguWARY6WNHzYA/DcfA6sv803TD0VR3smN4jnrnXFo101+XgX5kJ+B2UZajksEBsNvkGcejlmmQsO8RS70uYqRUYeO4chNnY7MGZCvyXRhR8txAfyYCss1D8cslXakjhGiYEPMaOQ8xmJBdNPISo6SCJ3UszN98ungF3lW9+pInXmYKhG0Xtkhd0BAQ01ALn0s6m9pWnYRv2zsLh7pSfTRCp47V32p6DMwFdMCA6320joVFjegrI7LdPwjfjKzzaF+rsF4lJGp8lDZEgvctB1GgioV6gP5oIavFxUhgMYtxi/iqUymKQtMeeSbGgbMneMENFQ1pSnTJih9pcgX41d4KMpTtxr1lSpNWaiMZaSvjrgExoVHOXTRF2CeWVcj4yIA8CePYXOOdBM+cq4WQXZ0lS5ygIBu4hPnAdhyb38I+Xh2QmHAI8dKHSFEztzRkeJDIAHHyZPLAQMFSEi1S0lfnAbJyZLFB6e5pCIlC0enWX1dAqIT0yxq/gHt4gXsH3e6cREAZs++qezbaWiXC5UQA+rsaEsgBD2FydA3eIZpoZZZetKN2deNSqtTFaqRymUO5pMCQYcFghjlGPnotcGYgx83K0m+kK8Zc0jz8AJUL8NvoFMwinhP9WQ98uW431yQ7AWEUEbLKc/o3aC9FLJFfROVjLIHQ2fn6KRYHYdPsVwTmAiSXxFMRvojjXx1ClCBKsz3Da3NawENp5TiXGXZULRtualCHkcxJ2dbfhgTFWhOfhAP/aqTX2FHpynfgeIhCwoS4JvkmsAXxp7guwzLo8fzu7LyQwy0EKHyuzjQ1z0qeBmyvRAa5CbrIdIDAZ2XF784P19olJ3b4hAj/S3y0uExfkzDtNmUpRfIGTT14335Ge9YAK+LyHOqEZojRM6cktqQzQYTmNP+CsYdctBnB41Co39bpNNpTKNOUSBETloxv3MfZmGLGKQBPLjaWmTmsuCC9SnIDdV/5tXPpF8jUh4KjxYZlClI700WRPQCqIhF2rMzPYQ947i4wGuk6lzL+sHjOjb+mGXS0H2WpSkglAXj3tLN6abBZG/r5yNAVYbK5xKAhegKAkKeAkxaTWYhgHkhhvNLhg4csAyQr9OpRJXAj51dEU5Bg+mcnVqahgHxc5kLqZ/UTQHGHvmpoQR+9Y3KuEGSrJiAYOIhG4ZxjAjYL8P4q3MgdpWYOXIlUMSven90oa4U0UTFRfFncJgAAhLNbJrpDHQPE79IEx2w5aQiNGjlmXAqf6BfKGnUnmg9KqQU+7RgIcDHrmVjCGBdSEBRW0hm09IBEgUMUL7niAzVn2AfaD1Xw1bUB0oJBAEEGy6ZhATnExwsqohCM7IvH+EK/a052Wdq/1gClBFmoLT11ejwhVk5EEDkwmyMBO5Yk5nGCNlQlc5y51OKCAgqdCBPAlKFz+wZRN5qZWqdKAkYPXI0hCNkg3j49kz7gR4Kdf2osJM8B7BreCN3s08xwj9lj6m8L0byUIUWPQcxBJIp7WL3GEYQ/K7B+oWhVG9V3EwuA97SJVd6Tp9pi0jxD060giUa5/avC+ZbHdaiBwrGTXdTAEbg/2OWPmoYGE1KY8jbie5lB6JHoRFwRJXze51cTP2JcfzdcV4DHpNldJszMS5gBN7LEq27Z1NXbjSRTZ8WUhAN0LXEulG6ndchr3BBLZeyFI3kCSOPKzmGUGlJ0ikGSC1B6BQ7154X+arrca0UhoS78A+yow8iBo1s1k9aRznX6Ir8iZ3MmwfZ2AQUq1sMv0ySCTxTl3nelZghvQqUIvalPFIDXcCThywFKeFCbehQv+SpTjWfRjxRtZ6+Q+uufFY5+mEPTp320LCfLtI7PZFWHgFe9ktspBMmECUNj9G3/lGnWeyj/1rUuvU1Kp7HoXZ5/R5R8eRndpCQNV0MGSKNSgo/yHyyKYd2wiY0sAX/bFIm5o3zrNmGR0rAwfPpALy4fo4ikqF4cx0Zgk2mD9ZJGIh0oRPMA0udrVOsaOBqi10ZHo0rHdnDn1LWpAe6rYJqUDWDcKg7VxGlrlMvBQ0EgpYa3EHzxzIXmdyE58KqAr9EzrdR4wh+P019bUxZsikQR8tGCET8GdWuTxOfBDxQMIBG0gCC3wZqVVJ4sCtMChclKOgR/kf6aSGsP0TqDoIMIaTQAkbC83fxV8AAJg0BAqSuwe/eSWyB5+4i2VyV8Nc8O+7puzxO6tH6+/d+/wJ95ur3ENUSMT2bOk7ME1jMBQBDnqqygMSBeZcH78aeIjgs0e8T/pk4VXfyM7kaxapSnY//VL3QCHRFcKJhMqEJDw18TcQEAZqwwK0ZS1Dw7BobWZ6XsoO1fezp9p+q+fPh1cujclOrlkXdn7iOwRpKsMqSaqSALliIe5Opa4/YhkkmuxGz/bz1PAdSPyVEcAUHd++5GIZKpqBvTfobdCiEu/DQDwotESkHDYgCUingR0xvv5r5a0HdyqgbQ5Bm7oa7Em3RxetpDorOtYabxiFa2lQVmr2s98j0t6X4oVSm8QuWo6ShbPmKTnqyXaQfQN2LbPotZ9iv+kNzU0XdcY6vXq+vHx9pBILO+TPDj+k/OzkWiPgxhc7d61Qm/2w+JsqAnuz9tIr1zOQGrZPLG/mg1dU3NYJ0gdFlfyBsaYJOBVZkabNdLak2A8DPTeEXlRM68xD8xW5KDOkamzTY43nGU/XcbTJnLh9ntH7cq7A7vb5IvOjo/O5GG7+s/NGAYvYfs2bY+t61vWpndzeQ5irRmTJ4lEY5z7+K0XsS3tDfXH67PnZQgxbxJxQzs/ozGh5MrqtTg7voSOZYibv3RWHevMvsQTGDIn6D82+vx3TGVXg8id8siR+zD2bWPhC6c6xVsCpEBs1uPMItgGd64orJE41JqjREMePR9U3WkhbqT7APNYl9JwE9UsGqFwnQMmccazQM18QFvTaZCp7F5rScxUMCbiQ5Cgjgwf6l7Pso4dUkTZgXUbU3LVMxoxUcRNCr+N31jutdrxbEvu/gR9lNG9UoDLrIfhjo0+omPE0ETMswrJcpBc8cs0UZElJNtY1e400ioes24pyOuxcWh5XlURan9zMrAaAXO+lpIkBlNy/+M7f0jO0SJKR6ic2oY61DbEYkwu4WjWm/JB43LOt9mdqTk4ofkvFRKxG/zzN42BFPdRZGdsNgDpghzVshb7KZJOpkz0UdVZtye6jRjJ1E5JhZwMHPhIWxrkXa1JLxbQcKgyyt1s3SyTMjHu0tgqZmAFhrRWorKrh1InolumUJWR+K4HGVzSInkzAshw91ogZJtYFi4VOSXwIwJky1d3dGTacyGKUgxyRiibNmM5T3s0Q1your5JrJJQFBGCc/EUoSyfxLOr8EUauXzQ/GBwrNNiP2ehdo1JWaa6rNIkMUqi97mMkLxCsMZVnuQrCq98wB/cURrLL8GfqWqRYRMOkuQ1t+4EZtModf64ymylxhlGPdR6WIkE9p0Sw9beCiE3WiMS+QAufmLrLncRk8IinMQWfyu8tE3SUvhPXMCb+5QJ2IoTq6+x8qCAs7qrxlQmOOoHJQRYrhfV9g7meWn4cWpnR+HtQqyER+94RnVGBZsjoRE0nzdAjvo5sblun3cjtRIj0YQ/WYFiUYi6J5Txi6GOYJA+8XMZ9t7COTNlf6pJQnWyjdVBDXGcXM81yldUwE9dNLmuk/5uYhWQeLARKg0DuZTmAnoUGa0a8rZ+Jxc0lkfahIZEdBGwQd7uKhl1xwXgcRglW2/GApTX9SCwXNkdE/qabG2IYz9XQL1DkZ2ejvZHmarwbKHbpWkfBmQ4ttMIgE5iHbADNJ9BeoTs5meZUtotBKwewCHdmS/AZBVaffU5gEq353a4FbChqs4abRSxWulYM5dudIJk5piF4H5pTyjExx4YoL5bxtLjj3T1bUyHzUM8TvKsIiIZiFCiZ6LlJEShUaeS+AFDUXspGKBq5W0G96zZAQvetRTnk6Vqxj8Z+KTk4JqM5lh/yOrYhUN0u7ZvkCpQNVDAUWFuL3kzRIok/GOmM6ylCPEVB5V5U54s46/ahyvsCeysMJiK1C6IZJGlzxR0xfK4cfWBu6sovZe+M+C8VP/jzveNepUsuBtQrBcHSmOk0BfAsQQHX7dURA9ZBEfEFexJ9ypw7dGOXgWR6AdYeFdNI5cQhqQQDPlALIPvpMvyRPv1zGQUMEGQF1Bqul4CTEL+O9UADfosEiC1WVqAJS09OvBlJXLM/u4IkK5yYKoMqaY4KEjKUAIieI7NM5piwwtad+juPQLQhMoKs5r2dUAZBb6rnCwTLwksj8akyGR95Xie0iPd6+KHkX+6racztJAPYEc5WzZwOcarD9GnsnWBApK9ZLnw54clkC2PKu7DaXA2tsAhMgHQ+Ie8phCFPj3NFHb2um7mlFJ18rI4OqRlulANqTb/LJ2UIBfhQwqMbwNIma0fVWh0UfI98hb8DChIMYtJqYj8sdEYckPTqnag3KlnCstQjoVeIRIBlgwUC5/EZCPpaaQAUptQ4RgzbjL32k4WNjFbGi04ROrXsRS+BXLx79lAJ09rRxbVTukhRwyiB50VGvRgEbr2Mi6Ex20RdDH61cF0wEwJ44HZ2NjTiDAqcZzH5oaJiojKH2dUDXFkaV8NnPS9PPembkCBTsGT4CEgf+vMa5GVdpDCtRm9QuZAhYgjsonwllxg/VQKZ1XgAw8aisNdZrRD2C0nx+Cr+luPNYBjhzUlqBwpQBjr8XrQJFBQAaRmMCnvkKaietQQdXe0UqGb2OMqNzFNhwy1EPj164qxYMFH4E9RBnIzIRPfWdzDaNWfL9l1iB3pUUwFPmWqPxK15wM0/q2JG6oMlsvMYKvxqlT4GqxZOVDOKxVgZfTrGgCJPu2B6jMYXLcpwaKxjp1WGdIkZmiqFsCMHIh6aHKBZM4QcGH05jeR3L9bY0uiZJq3DuFfZGaCz2EckHK+yALsoVfbjBB/t/NAgYSZZOZzZNG3TS/ZMZ/ErSry+Sr2EUbe+JAG0ZELqrsd+N9Sps1UaCRib5IYTN8Cslf1B1wGxDwW4UBCw9oARq2EC2WVSjcZlSWl4bpuCWxw9cF67edC4mw8wgLPHREqxIh2pYeVoezvX6XNXy1yzATAe6ZgWuZwzolaEN1MmQseYKdUGQ+oa5tTdSmn6wloFvcG1q3SuHEgiT8BqZNDQSCxWC1MvOS3xw+1cigGC2AV0XLfKFBMQ9P+BQaBh53FeounomqsvlOHPl/Rfc0s7Xm2quwMYD8AW1GvEdbC9WDShRBs0pi2LSWXuzDy4+Qy9ZQ3ky6CXPrLfClbCbenayts8g4P+XEkn+OqxpaccPrKIZn05t+xDQRqGN0DGCFRJ1SkhYtGG04sCdmlW5Ewrcot6ujNwJl8rNUofVAP5JsPKotaQWboDKXIMRMl5cbqNYyBNSsDBWtwxfh9W0aJVK3XGBLM2jDa0N5jajoJ8at47qRvwiJSokTUk0hfmXOz31acFGm3hVfqnL5FAl2SD0LU+njkKgldVL9v/uhWNETrZMg/Ldk5p3dcH2efRcZCtRCoBv1MdJdr0t2ITdfzhMziLTd3ArStXIUHJfLjb6qJbxMcBxcZ7SKVyLKQGMYxqY7NbbE+3ZMAaZ6IN1F8NhXNnsyev2cPOHVgUQV8/zaMQofUsXMhRaeeW9aojLjH3YRC+zXbE5elElJbNZFK27lnfGL9BBX/mAK574/jO+lv9Nr85QY5e0d/zERgCBIWkicJh2+lA96GSX+OUk6Hc2Sl3eAcAjbcxI9QI9BInHfqG3akp/waOtJelUfY39Db05eLgfnuuE2ix7fDXwyA8s01FLczS10YQ7zM+20qmlSFUmgw10XnRasS24FqGFXdJEz69OwxBtAl4EcdTOTy4kwa4Azc+WgUkyycOIGZeiPOPmf43qEV6l25mIJucQWGM/ONmD+LZ1V0555gr+6HC0ewuI26zVBJVih/LSeROmuEC7qBZFCujFl70dfgEgj+fQzIdio9svQTyeiewMh8PWaC7ecE6bIrtxOz2uo1G3EDqI3pJf/1bq5qMk8JxRDZ3Xtv4YoBH4Sa0tXK4cuWm8LIOf70SNHl7zi6rzUOFjEPM47wSXjC7mgVdzV3PR6x2OOfmbI0GH4rII1Spv6xRv2ubZyPjmzIMg9jtdZLeziTaClQapNSdLf9Rtt9gx5jg4Qa9jwowbOh/KTd43MXrI2vYHb/iNYxmOYK/c2jePGKbruoT9escHDGmZjlVzeJCSf61QBPX3LHofv6GZ343e4BtrOuNDlme6IMKd+bRpe4R2EDMNimkTxfS78wMXFC1i9D7hCnGuRBssC0jhpfxqbDrAhLzUnu3pwDjLg/C3FideHD5ZvOB61/yA6owhvjvO5SmA7AS4BnjNVcISR2kQfrtnYV3FsvgV9/G3NTSuy9GBOClm8jd2g0N2LxJ3F8dpXaqn+P3KhVvY688bfhiOnl36Uso8iGehDb4OZLhzD9i9WCG1sX8W7VnxqbNH+P3YRSNkdIaDgSD69viwa29lsI3fOuEsNvcOWp/pGfZkv90H9JX88tIix5otQomg9RaHkfvPQ0+8Ul6Yu+yNDyIh7VkmkV31+H1MBW11ztUt/sFu7FvYH3FbJBDnbRvxWOKhJMQzTtD3uM2dg2eLiBgsmlypGR+6Fl0Ggklwd7yFprc6ZEEoA3OLr8kdb7ScV068obBDofZJmlOERZzEtidxIWo9Lb8/k32lGX9Hnm5xni/5M6LCdj9w53s+zGNEPDFfNa8c4M54zTgfmzPiXz29i5e8zASD2/wEr0UGXWGNiBHEhqyzIEY5RdOwvdgvlqNXd/jCSKo342DfK+5Q+gj0JjGPeM2ZoKAXFe3B/wpdX7DjvzuQbp216tf9+O1+rFgqJCiZyS0DnZXgeJoTITbp+BNdTeO5wrai23dJ0FC3Xs/jV3ffajF31MblLmIuCwsBC8/cCf5kZ753dQqh7pvAXxfZfTaWc/woYNdb1uK/2BCU0hdBwvG0PZFJj9o7U8GmdnM/F34ju1vDct7vYrkLRbtix8Qj5MtEL4ZhYpePUUnUpYZ+4OaFFp7t2jMxgMiInuU41xvxdX4gKi5z/6FchDb44iIYr0aSaaT2bEJMI5H0DP0xu0Yms2Qu4c5K3v5ePX64PBEfGCW2QJDaF5mFLLTGNdEe1AI/KfSt7mJFk56uWTNdk1SCt+1snUrCXggr0Ky6c3p1fdlPPNDdJxyH2vQL9WYG/MRac69WmWVYp9c6647m8+5ZqzfMuPrnT7h+J8St/uPx4jb1wCi5sJlINuZ/KfRWTfHreoa30/++m1erHnrO9arjnP54vOyfpH4+9JMLtxvu+MAU/AdgHSQvFyC1iVYy6+T7lRPC6fvrz7vvfckD3R2pJVSUQT6cJTsI/NTufc80l2oibi42m9s0xTj0/CBVVbPJ7DMPXQaGLyRl0YkbasmDtXjPH7tJA9og9u73GAU5tJZ2CsPQypH9Mq0tNd40etlntlfZ5ko6avobobXMemUecb39cqSNY2u0eyNmxi8g7up32oQ86C1diVfmhRY9WPlrBXcNu/OXCZEsrPLs5u73K005DBeB9HoBWnpoGm+rWVRhGXY6aAc7nV575C92e9J0s3SjXSlmMPvaQKEkjMYkz7WO9hO7brMZMvJkOn2bBLSe65qGnVMN9mw74YX/HdBaTFxbFcZ7DIoeoSr4bxC7LHS6LxU1ioVAXLJb/3WkE6A785paW3qz4BmuvfyrkWNw5o8rhpHtCilCLdS23nTxd7KlBIbdxXZim3kKRIAGDQ2NYPwBr+cPQac1mq3eCNOTMhNAQsxcY7J9mZ/9VaagDHR6Z/PFbDUN7NA8hPEuBZfaCiOYbpeLebv398ubHoSYtrvr9Wi07nbPep3/K2j9g3/wD/4/w/8AUrStUfoHQN8AAAAASUVORK5CYII="/>
+          <p:cNvSpPr>
+            <a:spLocks noChangeAspect="1" noChangeArrowheads="1"/>
+          </p:cNvSpPr>
+          <p:nvPr/>
+        </p:nvSpPr>
+        <p:spPr bwMode="auto">
+          <a:xfrm>
+            <a:off x="460374" y="160337"/>
+            <a:ext cx="6062345" cy="6062365"/>
+          </a:xfrm>
+          <a:prstGeom prst="rect">
+            <a:avLst/>
+          </a:prstGeom>
+          <a:noFill/>
+          <a:extLst>
+            <a:ext uri="{909E8E84-426E-40DD-AFC4-6F175D3DCCD1}">
+              <a14:hiddenFill xmlns:a14="http://schemas.microsoft.com/office/drawing/2010/main">
+                <a:solidFill>
+                  <a:srgbClr val="FFFFFF"/>
+                </a:solidFill>
+              </a14:hiddenFill>
+            </a:ext>
+          </a:extLst>
+        </p:spPr>
+        <p:txBody>
+          <a:bodyPr vert="horz" wrap="square" lIns="91440" tIns="45720" rIns="91440" bIns="45720" numCol="1" anchor="t" anchorCtr="0" compatLnSpc="1">
+            <a:prstTxWarp prst="textNoShape">
+              <a:avLst/>
+            </a:prstTxWarp>
+          </a:bodyPr>
+          <a:lstStyle/>
+          <a:p>
+            <a:endParaRPr lang="en-US"/>
+          </a:p>
+        </p:txBody>
+      </p:sp>
+      <p:pic>
+        <p:nvPicPr>
+          <p:cNvPr id="1034" name="Picture 10" descr="http://www.linuxbrigade.com/wp-content/uploads/2013/06/mysql.png"/>
+          <p:cNvPicPr>
+            <a:picLocks noChangeAspect="1" noChangeArrowheads="1"/>
+          </p:cNvPicPr>
+          <p:nvPr/>
+        </p:nvPicPr>
+        <p:blipFill>
+          <a:blip r:embed="rId2">
+            <a:extLst>
+              <a:ext uri="{28A0092B-C50C-407E-A947-70E740481C1C}">
+                <a14:useLocalDpi xmlns:a14="http://schemas.microsoft.com/office/drawing/2010/main" val="0"/>
+              </a:ext>
+            </a:extLst>
+          </a:blip>
+          <a:srcRect/>
+          <a:stretch>
+            <a:fillRect/>
+          </a:stretch>
+        </p:blipFill>
+        <p:spPr bwMode="auto">
+          <a:xfrm>
+            <a:off x="3969375" y="2214694"/>
+            <a:ext cx="4253249" cy="4305224"/>
+          </a:xfrm>
+          <a:prstGeom prst="rect">
+            <a:avLst/>
+          </a:prstGeom>
+          <a:noFill/>
+          <a:extLst>
+            <a:ext uri="{909E8E84-426E-40DD-AFC4-6F175D3DCCD1}">
+              <a14:hiddenFill xmlns:a14="http://schemas.microsoft.com/office/drawing/2010/main">
+                <a:solidFill>
+                  <a:srgbClr val="FFFFFF"/>
+                </a:solidFill>
+              </a14:hiddenFill>
+            </a:ext>
+          </a:extLst>
+        </p:spPr>
+      </p:pic>
+    </p:spTree>
+    <p:extLst>
+      <p:ext uri="{BB962C8B-B14F-4D97-AF65-F5344CB8AC3E}">
+        <p14:creationId xmlns:p14="http://schemas.microsoft.com/office/powerpoint/2010/main" val="1702642191"/>
+      </p:ext>
+    </p:extLst>
+  </p:cSld>
+  <p:clrMapOvr>
+    <a:masterClrMapping/>
+  </p:clrMapOvr>
+</p:sld>
+</file>
+
+<file path=ppt/slides/slide21.xml><?xml version="1.0" encoding="utf-8"?>
+<p:sld xmlns:a="http://schemas.openxmlformats.org/drawingml/2006/main" xmlns:r="http://schemas.openxmlformats.org/officeDocument/2006/relationships" xmlns:p="http://schemas.openxmlformats.org/presentationml/2006/main">
+  <p:cSld>
+    <p:spTree>
+      <p:nvGrpSpPr>
+        <p:cNvPr id="1" name=""/>
+        <p:cNvGrpSpPr/>
+        <p:nvPr/>
+      </p:nvGrpSpPr>
+      <p:grpSpPr>
+        <a:xfrm>
+          <a:off x="0" y="0"/>
+          <a:ext cx="0" cy="0"/>
+          <a:chOff x="0" y="0"/>
+          <a:chExt cx="0" cy="0"/>
+        </a:xfrm>
+      </p:grpSpPr>
+      <p:sp>
+        <p:nvSpPr>
+          <p:cNvPr id="2" name="Title 1"/>
+          <p:cNvSpPr>
+            <a:spLocks noGrp="1"/>
+          </p:cNvSpPr>
+          <p:nvPr>
+            <p:ph type="title"/>
+          </p:nvPr>
+        </p:nvSpPr>
+        <p:spPr/>
+        <p:txBody>
+          <a:bodyPr/>
+          <a:lstStyle/>
+          <a:p>
+            <a:r>
+              <a:rPr lang="bg-BG" dirty="0" smtClean="0"/>
+              <a:t>Агрегатни функции</a:t>
+            </a:r>
+            <a:endParaRPr lang="en-US" dirty="0"/>
+          </a:p>
+        </p:txBody>
+      </p:sp>
+      <p:sp>
+        <p:nvSpPr>
+          <p:cNvPr id="3" name="Content Placeholder 2"/>
+          <p:cNvSpPr>
+            <a:spLocks noGrp="1"/>
+          </p:cNvSpPr>
+          <p:nvPr>
+            <p:ph sz="quarter" idx="13"/>
+          </p:nvPr>
+        </p:nvSpPr>
+        <p:spPr/>
+        <p:txBody>
+          <a:bodyPr/>
+          <a:lstStyle/>
+          <a:p>
+            <a:r>
+              <a:rPr lang="bg-BG" dirty="0" smtClean="0"/>
+              <a:t>С помощта на агрегатните функции можем да изчисляваме различни статистики за множества от стойности</a:t>
+            </a:r>
+          </a:p>
+          <a:p>
+            <a:r>
+              <a:rPr lang="en-US" dirty="0" smtClean="0"/>
+              <a:t>Group by </a:t>
+            </a:r>
+            <a:r>
+              <a:rPr lang="bg-BG" dirty="0" smtClean="0"/>
+              <a:t>помага за групиране на резултатите – така избираме колона на чиято база да стане изчислението на </a:t>
+            </a:r>
+            <a:r>
+              <a:rPr lang="bg-BG" dirty="0" err="1" smtClean="0"/>
+              <a:t>статис</a:t>
+            </a:r>
+            <a:r>
+              <a:rPr lang="en-US" dirty="0" smtClean="0"/>
+              <a:t>t</a:t>
+            </a:r>
+            <a:r>
+              <a:rPr lang="bg-BG" dirty="0" err="1" smtClean="0"/>
+              <a:t>иката</a:t>
+            </a:r>
+            <a:endParaRPr lang="bg-BG" dirty="0" smtClean="0"/>
+          </a:p>
+          <a:p>
+            <a:r>
+              <a:rPr lang="bg-BG" dirty="0" smtClean="0"/>
+              <a:t>Функции: </a:t>
+            </a:r>
+            <a:r>
+              <a:rPr lang="en-US" dirty="0" smtClean="0"/>
+              <a:t>sum, </a:t>
+            </a:r>
+            <a:r>
+              <a:rPr lang="en-US" dirty="0" err="1" smtClean="0"/>
+              <a:t>avg</a:t>
+            </a:r>
+            <a:r>
+              <a:rPr lang="en-US" dirty="0" smtClean="0"/>
+              <a:t>, count, min, max</a:t>
+            </a:r>
+            <a:endParaRPr lang="en-US" dirty="0"/>
+          </a:p>
+        </p:txBody>
+      </p:sp>
+    </p:spTree>
+    <p:extLst>
+      <p:ext uri="{BB962C8B-B14F-4D97-AF65-F5344CB8AC3E}">
+        <p14:creationId xmlns:p14="http://schemas.microsoft.com/office/powerpoint/2010/main" val="3884012569"/>
+      </p:ext>
+    </p:extLst>
+  </p:cSld>
+  <p:clrMapOvr>
+    <a:masterClrMapping/>
+  </p:clrMapOvr>
+</p:sld>
+</file>
+
+<file path=ppt/slides/slide22.xml><?xml version="1.0" encoding="utf-8"?>
 <p:sld xmlns:a="http://schemas.openxmlformats.org/drawingml/2006/main" xmlns:r="http://schemas.openxmlformats.org/officeDocument/2006/relationships" xmlns:p="http://schemas.openxmlformats.org/presentationml/2006/main">
   <p:cSld>
     <p:spTree>
@@ -7991,7 +8328,7 @@
 </p:sld>
 </file>
 
-<file path=ppt/slides/slide21.xml><?xml version="1.0" encoding="utf-8"?>
+<file path=ppt/slides/slide23.xml><?xml version="1.0" encoding="utf-8"?>
 <p:sld xmlns:a="http://schemas.openxmlformats.org/drawingml/2006/main" xmlns:r="http://schemas.openxmlformats.org/officeDocument/2006/relationships" xmlns:p="http://schemas.openxmlformats.org/presentationml/2006/main">
   <p:cSld>
     <p:spTree>

</xml_diff>